<commit_message>
updated plot for 3d blending matrix Nsx x Nsy
</commit_message>
<xml_diff>
--- a/Plots/DrawingsCartesianFormat.pptx
+++ b/Plots/DrawingsCartesianFormat.pptx
@@ -290,7 +290,7 @@
           <a:p>
             <a:fld id="{90BF91BF-1334-AF43-8C8F-C60AC41ADB65}" type="datetimeFigureOut">
               <a:rPr lang="en-US" smtClean="0"/>
-              <a:t>6/23/15</a:t>
+              <a:t>7/12/15</a:t>
             </a:fld>
             <a:endParaRPr lang="en-GB"/>
           </a:p>
@@ -460,7 +460,7 @@
           <a:p>
             <a:fld id="{90BF91BF-1334-AF43-8C8F-C60AC41ADB65}" type="datetimeFigureOut">
               <a:rPr lang="en-US" smtClean="0"/>
-              <a:t>6/23/15</a:t>
+              <a:t>7/12/15</a:t>
             </a:fld>
             <a:endParaRPr lang="en-GB"/>
           </a:p>
@@ -640,7 +640,7 @@
           <a:p>
             <a:fld id="{90BF91BF-1334-AF43-8C8F-C60AC41ADB65}" type="datetimeFigureOut">
               <a:rPr lang="en-US" smtClean="0"/>
-              <a:t>6/23/15</a:t>
+              <a:t>7/12/15</a:t>
             </a:fld>
             <a:endParaRPr lang="en-GB"/>
           </a:p>
@@ -810,7 +810,7 @@
           <a:p>
             <a:fld id="{90BF91BF-1334-AF43-8C8F-C60AC41ADB65}" type="datetimeFigureOut">
               <a:rPr lang="en-US" smtClean="0"/>
-              <a:t>6/23/15</a:t>
+              <a:t>7/12/15</a:t>
             </a:fld>
             <a:endParaRPr lang="en-GB"/>
           </a:p>
@@ -1056,7 +1056,7 @@
           <a:p>
             <a:fld id="{90BF91BF-1334-AF43-8C8F-C60AC41ADB65}" type="datetimeFigureOut">
               <a:rPr lang="en-US" smtClean="0"/>
-              <a:t>6/23/15</a:t>
+              <a:t>7/12/15</a:t>
             </a:fld>
             <a:endParaRPr lang="en-GB"/>
           </a:p>
@@ -1344,7 +1344,7 @@
           <a:p>
             <a:fld id="{90BF91BF-1334-AF43-8C8F-C60AC41ADB65}" type="datetimeFigureOut">
               <a:rPr lang="en-US" smtClean="0"/>
-              <a:t>6/23/15</a:t>
+              <a:t>7/12/15</a:t>
             </a:fld>
             <a:endParaRPr lang="en-GB"/>
           </a:p>
@@ -1766,7 +1766,7 @@
           <a:p>
             <a:fld id="{90BF91BF-1334-AF43-8C8F-C60AC41ADB65}" type="datetimeFigureOut">
               <a:rPr lang="en-US" smtClean="0"/>
-              <a:t>6/23/15</a:t>
+              <a:t>7/12/15</a:t>
             </a:fld>
             <a:endParaRPr lang="en-GB"/>
           </a:p>
@@ -1884,7 +1884,7 @@
           <a:p>
             <a:fld id="{90BF91BF-1334-AF43-8C8F-C60AC41ADB65}" type="datetimeFigureOut">
               <a:rPr lang="en-US" smtClean="0"/>
-              <a:t>6/23/15</a:t>
+              <a:t>7/12/15</a:t>
             </a:fld>
             <a:endParaRPr lang="en-GB"/>
           </a:p>
@@ -1979,7 +1979,7 @@
           <a:p>
             <a:fld id="{90BF91BF-1334-AF43-8C8F-C60AC41ADB65}" type="datetimeFigureOut">
               <a:rPr lang="en-US" smtClean="0"/>
-              <a:t>6/23/15</a:t>
+              <a:t>7/12/15</a:t>
             </a:fld>
             <a:endParaRPr lang="en-GB"/>
           </a:p>
@@ -2256,7 +2256,7 @@
           <a:p>
             <a:fld id="{90BF91BF-1334-AF43-8C8F-C60AC41ADB65}" type="datetimeFigureOut">
               <a:rPr lang="en-US" smtClean="0"/>
-              <a:t>6/23/15</a:t>
+              <a:t>7/12/15</a:t>
             </a:fld>
             <a:endParaRPr lang="en-GB"/>
           </a:p>
@@ -2509,7 +2509,7 @@
           <a:p>
             <a:fld id="{90BF91BF-1334-AF43-8C8F-C60AC41ADB65}" type="datetimeFigureOut">
               <a:rPr lang="en-US" smtClean="0"/>
-              <a:t>6/23/15</a:t>
+              <a:t>7/12/15</a:t>
             </a:fld>
             <a:endParaRPr lang="en-GB"/>
           </a:p>
@@ -2722,7 +2722,7 @@
           <a:p>
             <a:fld id="{90BF91BF-1334-AF43-8C8F-C60AC41ADB65}" type="datetimeFigureOut">
               <a:rPr lang="en-US" smtClean="0"/>
-              <a:t>6/23/15</a:t>
+              <a:t>7/12/15</a:t>
             </a:fld>
             <a:endParaRPr lang="en-GB"/>
           </a:p>
@@ -10294,7 +10294,7 @@
         <p:spPr>
           <a:xfrm>
             <a:off x="5192263" y="3016802"/>
-            <a:ext cx="721448" cy="461665"/>
+            <a:ext cx="1646032" cy="461665"/>
           </a:xfrm>
           <a:prstGeom prst="rect">
             <a:avLst/>
@@ -10315,7 +10315,35 @@
               <a:t>Ns</a:t>
             </a:r>
             <a:r>
-              <a:rPr lang="en-GB" sz="2400" i="1" baseline="-25000" dirty="0" err="1">
+              <a:rPr lang="en-GB" sz="2400" i="1" baseline="-25000" dirty="0" err="1" smtClean="0">
+                <a:latin typeface="Times New Roman"/>
+                <a:cs typeface="Times New Roman"/>
+              </a:rPr>
+              <a:t>x</a:t>
+            </a:r>
+            <a:r>
+              <a:rPr lang="en-GB" sz="2400" i="1" dirty="0" smtClean="0">
+                <a:latin typeface="Times New Roman"/>
+                <a:cs typeface="Times New Roman"/>
+              </a:rPr>
+              <a:t> </a:t>
+            </a:r>
+            <a:r>
+              <a:rPr lang="en-GB" sz="2400" dirty="0" smtClean="0">
+                <a:latin typeface="Times New Roman"/>
+                <a:cs typeface="Times New Roman"/>
+              </a:rPr>
+              <a:t>x </a:t>
+            </a:r>
+            <a:r>
+              <a:rPr lang="en-GB" sz="2400" i="1" dirty="0" err="1" smtClean="0">
+                <a:latin typeface="Times New Roman"/>
+                <a:cs typeface="Times New Roman"/>
+              </a:rPr>
+              <a:t>Ns</a:t>
+            </a:r>
+            <a:r>
+              <a:rPr lang="en-GB" sz="2400" i="1" baseline="-25000" dirty="0" err="1" smtClean="0">
                 <a:latin typeface="Times New Roman"/>
                 <a:cs typeface="Times New Roman"/>
               </a:rPr>

</xml_diff>

<commit_message>
before working on 3d fkk filter text
</commit_message>
<xml_diff>
--- a/Plots/DrawingsCartesianFormat.pptx
+++ b/Plots/DrawingsCartesianFormat.pptx
@@ -8,6 +8,7 @@
     <p:sldId id="256" r:id="rId2"/>
     <p:sldId id="257" r:id="rId3"/>
     <p:sldId id="258" r:id="rId4"/>
+    <p:sldId id="259" r:id="rId5"/>
   </p:sldIdLst>
   <p:sldSz cx="9144000" cy="6858000" type="screen4x3"/>
   <p:notesSz cx="6858000" cy="9144000"/>
@@ -290,7 +291,7 @@
           <a:p>
             <a:fld id="{90BF91BF-1334-AF43-8C8F-C60AC41ADB65}" type="datetimeFigureOut">
               <a:rPr lang="en-US" smtClean="0"/>
-              <a:t>7/12/15</a:t>
+              <a:t>7/16/15</a:t>
             </a:fld>
             <a:endParaRPr lang="en-GB"/>
           </a:p>
@@ -460,7 +461,7 @@
           <a:p>
             <a:fld id="{90BF91BF-1334-AF43-8C8F-C60AC41ADB65}" type="datetimeFigureOut">
               <a:rPr lang="en-US" smtClean="0"/>
-              <a:t>7/12/15</a:t>
+              <a:t>7/16/15</a:t>
             </a:fld>
             <a:endParaRPr lang="en-GB"/>
           </a:p>
@@ -640,7 +641,7 @@
           <a:p>
             <a:fld id="{90BF91BF-1334-AF43-8C8F-C60AC41ADB65}" type="datetimeFigureOut">
               <a:rPr lang="en-US" smtClean="0"/>
-              <a:t>7/12/15</a:t>
+              <a:t>7/16/15</a:t>
             </a:fld>
             <a:endParaRPr lang="en-GB"/>
           </a:p>
@@ -810,7 +811,7 @@
           <a:p>
             <a:fld id="{90BF91BF-1334-AF43-8C8F-C60AC41ADB65}" type="datetimeFigureOut">
               <a:rPr lang="en-US" smtClean="0"/>
-              <a:t>7/12/15</a:t>
+              <a:t>7/16/15</a:t>
             </a:fld>
             <a:endParaRPr lang="en-GB"/>
           </a:p>
@@ -1056,7 +1057,7 @@
           <a:p>
             <a:fld id="{90BF91BF-1334-AF43-8C8F-C60AC41ADB65}" type="datetimeFigureOut">
               <a:rPr lang="en-US" smtClean="0"/>
-              <a:t>7/12/15</a:t>
+              <a:t>7/16/15</a:t>
             </a:fld>
             <a:endParaRPr lang="en-GB"/>
           </a:p>
@@ -1344,7 +1345,7 @@
           <a:p>
             <a:fld id="{90BF91BF-1334-AF43-8C8F-C60AC41ADB65}" type="datetimeFigureOut">
               <a:rPr lang="en-US" smtClean="0"/>
-              <a:t>7/12/15</a:t>
+              <a:t>7/16/15</a:t>
             </a:fld>
             <a:endParaRPr lang="en-GB"/>
           </a:p>
@@ -1766,7 +1767,7 @@
           <a:p>
             <a:fld id="{90BF91BF-1334-AF43-8C8F-C60AC41ADB65}" type="datetimeFigureOut">
               <a:rPr lang="en-US" smtClean="0"/>
-              <a:t>7/12/15</a:t>
+              <a:t>7/16/15</a:t>
             </a:fld>
             <a:endParaRPr lang="en-GB"/>
           </a:p>
@@ -1884,7 +1885,7 @@
           <a:p>
             <a:fld id="{90BF91BF-1334-AF43-8C8F-C60AC41ADB65}" type="datetimeFigureOut">
               <a:rPr lang="en-US" smtClean="0"/>
-              <a:t>7/12/15</a:t>
+              <a:t>7/16/15</a:t>
             </a:fld>
             <a:endParaRPr lang="en-GB"/>
           </a:p>
@@ -1979,7 +1980,7 @@
           <a:p>
             <a:fld id="{90BF91BF-1334-AF43-8C8F-C60AC41ADB65}" type="datetimeFigureOut">
               <a:rPr lang="en-US" smtClean="0"/>
-              <a:t>7/12/15</a:t>
+              <a:t>7/16/15</a:t>
             </a:fld>
             <a:endParaRPr lang="en-GB"/>
           </a:p>
@@ -2256,7 +2257,7 @@
           <a:p>
             <a:fld id="{90BF91BF-1334-AF43-8C8F-C60AC41ADB65}" type="datetimeFigureOut">
               <a:rPr lang="en-US" smtClean="0"/>
-              <a:t>7/12/15</a:t>
+              <a:t>7/16/15</a:t>
             </a:fld>
             <a:endParaRPr lang="en-GB"/>
           </a:p>
@@ -2509,7 +2510,7 @@
           <a:p>
             <a:fld id="{90BF91BF-1334-AF43-8C8F-C60AC41ADB65}" type="datetimeFigureOut">
               <a:rPr lang="en-US" smtClean="0"/>
-              <a:t>7/12/15</a:t>
+              <a:t>7/16/15</a:t>
             </a:fld>
             <a:endParaRPr lang="en-GB"/>
           </a:p>
@@ -2722,7 +2723,7 @@
           <a:p>
             <a:fld id="{90BF91BF-1334-AF43-8C8F-C60AC41ADB65}" type="datetimeFigureOut">
               <a:rPr lang="en-US" smtClean="0"/>
-              <a:t>7/12/15</a:t>
+              <a:t>7/16/15</a:t>
             </a:fld>
             <a:endParaRPr lang="en-GB"/>
           </a:p>
@@ -10496,6 +10497,4253 @@
 </p:sld>
 </file>
 
+<file path=ppt/slides/slide4.xml><?xml version="1.0" encoding="utf-8"?>
+<p:sld xmlns:a="http://schemas.openxmlformats.org/drawingml/2006/main" xmlns:r="http://schemas.openxmlformats.org/officeDocument/2006/relationships" xmlns:p="http://schemas.openxmlformats.org/presentationml/2006/main">
+  <p:cSld>
+    <p:spTree>
+      <p:nvGrpSpPr>
+        <p:cNvPr id="1" name=""/>
+        <p:cNvGrpSpPr/>
+        <p:nvPr/>
+      </p:nvGrpSpPr>
+      <p:grpSpPr>
+        <a:xfrm>
+          <a:off x="0" y="0"/>
+          <a:ext cx="0" cy="0"/>
+          <a:chOff x="0" y="0"/>
+          <a:chExt cx="0" cy="0"/>
+        </a:xfrm>
+      </p:grpSpPr>
+      <p:grpSp>
+        <p:nvGrpSpPr>
+          <p:cNvPr id="63" name="Group 62"/>
+          <p:cNvGrpSpPr/>
+          <p:nvPr/>
+        </p:nvGrpSpPr>
+        <p:grpSpPr>
+          <a:xfrm>
+            <a:off x="-108637" y="2837107"/>
+            <a:ext cx="3495182" cy="3828766"/>
+            <a:chOff x="1162019" y="1977954"/>
+            <a:chExt cx="4261483" cy="4668204"/>
+          </a:xfrm>
+          <a:scene3d>
+            <a:camera prst="isometricOffAxis2Left"/>
+            <a:lightRig rig="threePt" dir="t"/>
+          </a:scene3d>
+        </p:grpSpPr>
+        <p:grpSp>
+          <p:nvGrpSpPr>
+            <p:cNvPr id="4" name="Group 3"/>
+            <p:cNvGrpSpPr/>
+            <p:nvPr/>
+          </p:nvGrpSpPr>
+          <p:grpSpPr>
+            <a:xfrm>
+              <a:off x="2398538" y="2988051"/>
+              <a:ext cx="3024964" cy="3658107"/>
+              <a:chOff x="3790273" y="1780037"/>
+              <a:chExt cx="3024964" cy="3658107"/>
+            </a:xfrm>
+          </p:grpSpPr>
+          <p:grpSp>
+            <p:nvGrpSpPr>
+              <p:cNvPr id="5" name="Group 4"/>
+              <p:cNvGrpSpPr/>
+              <p:nvPr/>
+            </p:nvGrpSpPr>
+            <p:grpSpPr>
+              <a:xfrm>
+                <a:off x="3790273" y="1780037"/>
+                <a:ext cx="3024964" cy="3658107"/>
+                <a:chOff x="6260978" y="1597390"/>
+                <a:chExt cx="3024964" cy="3658107"/>
+              </a:xfrm>
+            </p:grpSpPr>
+            <p:sp>
+              <p:nvSpPr>
+                <p:cNvPr id="8" name="Rectangle 7"/>
+                <p:cNvSpPr/>
+                <p:nvPr/>
+              </p:nvSpPr>
+              <p:spPr>
+                <a:xfrm>
+                  <a:off x="6403367" y="1597390"/>
+                  <a:ext cx="2740633" cy="3658107"/>
+                </a:xfrm>
+                <a:prstGeom prst="rect">
+                  <a:avLst/>
+                </a:prstGeom>
+                <a:noFill/>
+                <a:ln w="25400">
+                  <a:solidFill>
+                    <a:schemeClr val="tx1"/>
+                  </a:solidFill>
+                </a:ln>
+                <a:effectLst/>
+              </p:spPr>
+              <p:style>
+                <a:lnRef idx="1">
+                  <a:schemeClr val="accent1"/>
+                </a:lnRef>
+                <a:fillRef idx="3">
+                  <a:schemeClr val="accent1"/>
+                </a:fillRef>
+                <a:effectRef idx="2">
+                  <a:schemeClr val="accent1"/>
+                </a:effectRef>
+                <a:fontRef idx="minor">
+                  <a:schemeClr val="lt1"/>
+                </a:fontRef>
+              </p:style>
+              <p:txBody>
+                <a:bodyPr rtlCol="0" anchor="ctr"/>
+                <a:lstStyle/>
+                <a:p>
+                  <a:pPr algn="ctr"/>
+                  <a:endParaRPr lang="en-GB" sz="2000"/>
+                </a:p>
+              </p:txBody>
+            </p:sp>
+            <p:sp>
+              <p:nvSpPr>
+                <p:cNvPr id="9" name="Rectangle 8"/>
+                <p:cNvSpPr/>
+                <p:nvPr/>
+              </p:nvSpPr>
+              <p:spPr>
+                <a:xfrm>
+                  <a:off x="6403968" y="1604995"/>
+                  <a:ext cx="1365883" cy="912331"/>
+                </a:xfrm>
+                <a:prstGeom prst="rect">
+                  <a:avLst/>
+                </a:prstGeom>
+                <a:noFill/>
+                <a:ln w="19050">
+                  <a:solidFill>
+                    <a:schemeClr val="tx1"/>
+                  </a:solidFill>
+                </a:ln>
+                <a:effectLst/>
+              </p:spPr>
+              <p:style>
+                <a:lnRef idx="1">
+                  <a:schemeClr val="accent1"/>
+                </a:lnRef>
+                <a:fillRef idx="3">
+                  <a:schemeClr val="accent1"/>
+                </a:fillRef>
+                <a:effectRef idx="2">
+                  <a:schemeClr val="accent1"/>
+                </a:effectRef>
+                <a:fontRef idx="minor">
+                  <a:schemeClr val="lt1"/>
+                </a:fontRef>
+              </p:style>
+              <p:txBody>
+                <a:bodyPr rtlCol="0" anchor="ctr"/>
+                <a:lstStyle/>
+                <a:p>
+                  <a:pPr algn="ctr"/>
+                  <a:endParaRPr lang="en-GB" sz="2800"/>
+                </a:p>
+              </p:txBody>
+            </p:sp>
+            <p:sp>
+              <p:nvSpPr>
+                <p:cNvPr id="10" name="Rectangle 9"/>
+                <p:cNvSpPr/>
+                <p:nvPr/>
+              </p:nvSpPr>
+              <p:spPr>
+                <a:xfrm>
+                  <a:off x="7771054" y="1604995"/>
+                  <a:ext cx="1377705" cy="912331"/>
+                </a:xfrm>
+                <a:prstGeom prst="rect">
+                  <a:avLst/>
+                </a:prstGeom>
+                <a:noFill/>
+                <a:ln w="19050">
+                  <a:solidFill>
+                    <a:schemeClr val="tx1"/>
+                  </a:solidFill>
+                </a:ln>
+                <a:effectLst/>
+              </p:spPr>
+              <p:style>
+                <a:lnRef idx="1">
+                  <a:schemeClr val="accent1"/>
+                </a:lnRef>
+                <a:fillRef idx="3">
+                  <a:schemeClr val="accent1"/>
+                </a:fillRef>
+                <a:effectRef idx="2">
+                  <a:schemeClr val="accent1"/>
+                </a:effectRef>
+                <a:fontRef idx="minor">
+                  <a:schemeClr val="lt1"/>
+                </a:fontRef>
+              </p:style>
+              <p:txBody>
+                <a:bodyPr rtlCol="0" anchor="ctr"/>
+                <a:lstStyle/>
+                <a:p>
+                  <a:pPr algn="ctr"/>
+                  <a:endParaRPr lang="en-GB" sz="2000"/>
+                </a:p>
+              </p:txBody>
+            </p:sp>
+            <p:sp>
+              <p:nvSpPr>
+                <p:cNvPr id="11" name="Rectangle 10"/>
+                <p:cNvSpPr/>
+                <p:nvPr/>
+              </p:nvSpPr>
+              <p:spPr>
+                <a:xfrm>
+                  <a:off x="6405171" y="2517326"/>
+                  <a:ext cx="1365883" cy="912331"/>
+                </a:xfrm>
+                <a:prstGeom prst="rect">
+                  <a:avLst/>
+                </a:prstGeom>
+                <a:noFill/>
+                <a:ln w="19050">
+                  <a:solidFill>
+                    <a:schemeClr val="tx1"/>
+                  </a:solidFill>
+                </a:ln>
+                <a:effectLst/>
+              </p:spPr>
+              <p:style>
+                <a:lnRef idx="1">
+                  <a:schemeClr val="accent1"/>
+                </a:lnRef>
+                <a:fillRef idx="3">
+                  <a:schemeClr val="accent1"/>
+                </a:fillRef>
+                <a:effectRef idx="2">
+                  <a:schemeClr val="accent1"/>
+                </a:effectRef>
+                <a:fontRef idx="minor">
+                  <a:schemeClr val="lt1"/>
+                </a:fontRef>
+              </p:style>
+              <p:txBody>
+                <a:bodyPr rtlCol="0" anchor="ctr"/>
+                <a:lstStyle/>
+                <a:p>
+                  <a:pPr algn="ctr"/>
+                  <a:endParaRPr lang="en-GB" sz="2000"/>
+                </a:p>
+              </p:txBody>
+            </p:sp>
+            <p:sp>
+              <p:nvSpPr>
+                <p:cNvPr id="12" name="Rectangle 11"/>
+                <p:cNvSpPr/>
+                <p:nvPr/>
+              </p:nvSpPr>
+              <p:spPr>
+                <a:xfrm>
+                  <a:off x="7772257" y="2517326"/>
+                  <a:ext cx="1377705" cy="912331"/>
+                </a:xfrm>
+                <a:prstGeom prst="rect">
+                  <a:avLst/>
+                </a:prstGeom>
+                <a:noFill/>
+                <a:ln w="19050">
+                  <a:solidFill>
+                    <a:schemeClr val="tx1"/>
+                  </a:solidFill>
+                </a:ln>
+                <a:effectLst/>
+              </p:spPr>
+              <p:style>
+                <a:lnRef idx="1">
+                  <a:schemeClr val="accent1"/>
+                </a:lnRef>
+                <a:fillRef idx="3">
+                  <a:schemeClr val="accent1"/>
+                </a:fillRef>
+                <a:effectRef idx="2">
+                  <a:schemeClr val="accent1"/>
+                </a:effectRef>
+                <a:fontRef idx="minor">
+                  <a:schemeClr val="lt1"/>
+                </a:fontRef>
+              </p:style>
+              <p:txBody>
+                <a:bodyPr rtlCol="0" anchor="ctr"/>
+                <a:lstStyle/>
+                <a:p>
+                  <a:pPr algn="ctr"/>
+                  <a:endParaRPr lang="en-GB" sz="2000"/>
+                </a:p>
+              </p:txBody>
+            </p:sp>
+            <p:sp>
+              <p:nvSpPr>
+                <p:cNvPr id="13" name="Rectangle 12"/>
+                <p:cNvSpPr/>
+                <p:nvPr/>
+              </p:nvSpPr>
+              <p:spPr>
+                <a:xfrm>
+                  <a:off x="6403968" y="4341988"/>
+                  <a:ext cx="1365883" cy="912331"/>
+                </a:xfrm>
+                <a:prstGeom prst="rect">
+                  <a:avLst/>
+                </a:prstGeom>
+                <a:noFill/>
+                <a:ln w="19050">
+                  <a:solidFill>
+                    <a:schemeClr val="tx1"/>
+                  </a:solidFill>
+                </a:ln>
+                <a:effectLst/>
+              </p:spPr>
+              <p:style>
+                <a:lnRef idx="1">
+                  <a:schemeClr val="accent1"/>
+                </a:lnRef>
+                <a:fillRef idx="3">
+                  <a:schemeClr val="accent1"/>
+                </a:fillRef>
+                <a:effectRef idx="2">
+                  <a:schemeClr val="accent1"/>
+                </a:effectRef>
+                <a:fontRef idx="minor">
+                  <a:schemeClr val="lt1"/>
+                </a:fontRef>
+              </p:style>
+              <p:txBody>
+                <a:bodyPr rtlCol="0" anchor="ctr"/>
+                <a:lstStyle/>
+                <a:p>
+                  <a:pPr algn="ctr"/>
+                  <a:endParaRPr lang="en-GB" sz="2000"/>
+                </a:p>
+              </p:txBody>
+            </p:sp>
+            <p:sp>
+              <p:nvSpPr>
+                <p:cNvPr id="14" name="Rectangle 13"/>
+                <p:cNvSpPr/>
+                <p:nvPr/>
+              </p:nvSpPr>
+              <p:spPr>
+                <a:xfrm>
+                  <a:off x="7771054" y="4341988"/>
+                  <a:ext cx="1377705" cy="912331"/>
+                </a:xfrm>
+                <a:prstGeom prst="rect">
+                  <a:avLst/>
+                </a:prstGeom>
+                <a:noFill/>
+                <a:ln w="19050">
+                  <a:solidFill>
+                    <a:schemeClr val="tx1"/>
+                  </a:solidFill>
+                </a:ln>
+                <a:effectLst/>
+              </p:spPr>
+              <p:style>
+                <a:lnRef idx="1">
+                  <a:schemeClr val="accent1"/>
+                </a:lnRef>
+                <a:fillRef idx="3">
+                  <a:schemeClr val="accent1"/>
+                </a:fillRef>
+                <a:effectRef idx="2">
+                  <a:schemeClr val="accent1"/>
+                </a:effectRef>
+                <a:fontRef idx="minor">
+                  <a:schemeClr val="lt1"/>
+                </a:fontRef>
+              </p:style>
+              <p:txBody>
+                <a:bodyPr rtlCol="0" anchor="ctr"/>
+                <a:lstStyle/>
+                <a:p>
+                  <a:pPr algn="ctr"/>
+                  <a:endParaRPr lang="en-GB" sz="2000"/>
+                </a:p>
+              </p:txBody>
+            </p:sp>
+            <p:sp>
+              <p:nvSpPr>
+                <p:cNvPr id="15" name="Rectangle 14"/>
+                <p:cNvSpPr/>
+                <p:nvPr/>
+              </p:nvSpPr>
+              <p:spPr>
+                <a:xfrm>
+                  <a:off x="6403968" y="3429657"/>
+                  <a:ext cx="1365883" cy="912331"/>
+                </a:xfrm>
+                <a:prstGeom prst="rect">
+                  <a:avLst/>
+                </a:prstGeom>
+                <a:noFill/>
+                <a:ln w="19050">
+                  <a:solidFill>
+                    <a:schemeClr val="tx1"/>
+                  </a:solidFill>
+                </a:ln>
+                <a:effectLst/>
+              </p:spPr>
+              <p:style>
+                <a:lnRef idx="1">
+                  <a:schemeClr val="accent1"/>
+                </a:lnRef>
+                <a:fillRef idx="3">
+                  <a:schemeClr val="accent1"/>
+                </a:fillRef>
+                <a:effectRef idx="2">
+                  <a:schemeClr val="accent1"/>
+                </a:effectRef>
+                <a:fontRef idx="minor">
+                  <a:schemeClr val="lt1"/>
+                </a:fontRef>
+              </p:style>
+              <p:txBody>
+                <a:bodyPr rtlCol="0" anchor="ctr"/>
+                <a:lstStyle/>
+                <a:p>
+                  <a:pPr algn="ctr"/>
+                  <a:endParaRPr lang="en-GB" sz="2000"/>
+                </a:p>
+              </p:txBody>
+            </p:sp>
+            <p:sp>
+              <p:nvSpPr>
+                <p:cNvPr id="16" name="Rectangle 15"/>
+                <p:cNvSpPr/>
+                <p:nvPr/>
+              </p:nvSpPr>
+              <p:spPr>
+                <a:xfrm>
+                  <a:off x="7771054" y="3429657"/>
+                  <a:ext cx="1377705" cy="912331"/>
+                </a:xfrm>
+                <a:prstGeom prst="rect">
+                  <a:avLst/>
+                </a:prstGeom>
+                <a:noFill/>
+                <a:ln w="19050">
+                  <a:solidFill>
+                    <a:schemeClr val="tx1"/>
+                  </a:solidFill>
+                </a:ln>
+                <a:effectLst/>
+              </p:spPr>
+              <p:style>
+                <a:lnRef idx="1">
+                  <a:schemeClr val="accent1"/>
+                </a:lnRef>
+                <a:fillRef idx="3">
+                  <a:schemeClr val="accent1"/>
+                </a:fillRef>
+                <a:effectRef idx="2">
+                  <a:schemeClr val="accent1"/>
+                </a:effectRef>
+                <a:fontRef idx="minor">
+                  <a:schemeClr val="lt1"/>
+                </a:fontRef>
+              </p:style>
+              <p:txBody>
+                <a:bodyPr rtlCol="0" anchor="ctr"/>
+                <a:lstStyle/>
+                <a:p>
+                  <a:pPr algn="ctr"/>
+                  <a:endParaRPr lang="en-GB" sz="2000"/>
+                </a:p>
+              </p:txBody>
+            </p:sp>
+            <p:sp>
+              <p:nvSpPr>
+                <p:cNvPr id="17" name="TextBox 16"/>
+                <p:cNvSpPr txBox="1"/>
+                <p:nvPr/>
+              </p:nvSpPr>
+              <p:spPr>
+                <a:xfrm>
+                  <a:off x="8091665" y="1695375"/>
+                  <a:ext cx="730075" cy="637933"/>
+                </a:xfrm>
+                <a:prstGeom prst="rect">
+                  <a:avLst/>
+                </a:prstGeom>
+                <a:noFill/>
+              </p:spPr>
+              <p:txBody>
+                <a:bodyPr wrap="square" rtlCol="0">
+                  <a:spAutoFit/>
+                </a:bodyPr>
+                <a:lstStyle/>
+                <a:p>
+                  <a:pPr algn="ctr"/>
+                  <a:r>
+                    <a:rPr lang="en-GB" sz="2800" dirty="0" smtClean="0">
+                      <a:latin typeface="Times New Roman"/>
+                      <a:cs typeface="Times New Roman"/>
+                    </a:rPr>
+                    <a:t>0</a:t>
+                  </a:r>
+                  <a:endParaRPr lang="en-GB" sz="2800" dirty="0">
+                    <a:latin typeface="Times New Roman"/>
+                    <a:cs typeface="Times New Roman"/>
+                  </a:endParaRPr>
+                </a:p>
+              </p:txBody>
+            </p:sp>
+            <p:sp>
+              <p:nvSpPr>
+                <p:cNvPr id="18" name="TextBox 17"/>
+                <p:cNvSpPr txBox="1"/>
+                <p:nvPr/>
+              </p:nvSpPr>
+              <p:spPr>
+                <a:xfrm>
+                  <a:off x="6723377" y="4456349"/>
+                  <a:ext cx="730075" cy="637933"/>
+                </a:xfrm>
+                <a:prstGeom prst="rect">
+                  <a:avLst/>
+                </a:prstGeom>
+                <a:noFill/>
+              </p:spPr>
+              <p:txBody>
+                <a:bodyPr wrap="square" rtlCol="0">
+                  <a:spAutoFit/>
+                </a:bodyPr>
+                <a:lstStyle/>
+                <a:p>
+                  <a:pPr algn="ctr"/>
+                  <a:r>
+                    <a:rPr lang="en-GB" sz="2800" dirty="0" smtClean="0">
+                      <a:latin typeface="Times New Roman"/>
+                      <a:cs typeface="Times New Roman"/>
+                    </a:rPr>
+                    <a:t>0</a:t>
+                  </a:r>
+                  <a:endParaRPr lang="en-GB" sz="2800" dirty="0">
+                    <a:latin typeface="Times New Roman"/>
+                    <a:cs typeface="Times New Roman"/>
+                  </a:endParaRPr>
+                </a:p>
+              </p:txBody>
+            </p:sp>
+            <p:sp>
+              <p:nvSpPr>
+                <p:cNvPr id="19" name="TextBox 18"/>
+                <p:cNvSpPr txBox="1"/>
+                <p:nvPr/>
+              </p:nvSpPr>
+              <p:spPr>
+                <a:xfrm>
+                  <a:off x="6724580" y="2601668"/>
+                  <a:ext cx="730075" cy="637933"/>
+                </a:xfrm>
+                <a:prstGeom prst="rect">
+                  <a:avLst/>
+                </a:prstGeom>
+                <a:noFill/>
+              </p:spPr>
+              <p:txBody>
+                <a:bodyPr wrap="square" rtlCol="0">
+                  <a:spAutoFit/>
+                </a:bodyPr>
+                <a:lstStyle/>
+                <a:p>
+                  <a:pPr algn="ctr"/>
+                  <a:r>
+                    <a:rPr lang="en-GB" sz="2800" dirty="0" smtClean="0">
+                      <a:latin typeface="Times New Roman"/>
+                      <a:cs typeface="Times New Roman"/>
+                    </a:rPr>
+                    <a:t>0</a:t>
+                  </a:r>
+                  <a:endParaRPr lang="en-GB" sz="2800" dirty="0">
+                    <a:latin typeface="Times New Roman"/>
+                    <a:cs typeface="Times New Roman"/>
+                  </a:endParaRPr>
+                </a:p>
+              </p:txBody>
+            </p:sp>
+            <p:sp>
+              <p:nvSpPr>
+                <p:cNvPr id="20" name="TextBox 19"/>
+                <p:cNvSpPr txBox="1"/>
+                <p:nvPr/>
+              </p:nvSpPr>
+              <p:spPr>
+                <a:xfrm>
+                  <a:off x="8091665" y="3537899"/>
+                  <a:ext cx="730075" cy="637933"/>
+                </a:xfrm>
+                <a:prstGeom prst="rect">
+                  <a:avLst/>
+                </a:prstGeom>
+                <a:noFill/>
+              </p:spPr>
+              <p:txBody>
+                <a:bodyPr wrap="square" rtlCol="0">
+                  <a:spAutoFit/>
+                </a:bodyPr>
+                <a:lstStyle/>
+                <a:p>
+                  <a:pPr algn="ctr"/>
+                  <a:r>
+                    <a:rPr lang="en-GB" sz="2800" dirty="0" smtClean="0">
+                      <a:latin typeface="Times New Roman"/>
+                      <a:cs typeface="Times New Roman"/>
+                    </a:rPr>
+                    <a:t>0</a:t>
+                  </a:r>
+                  <a:endParaRPr lang="en-GB" sz="2800" dirty="0">
+                    <a:latin typeface="Times New Roman"/>
+                    <a:cs typeface="Times New Roman"/>
+                  </a:endParaRPr>
+                </a:p>
+              </p:txBody>
+            </p:sp>
+            <p:sp>
+              <p:nvSpPr>
+                <p:cNvPr id="21" name="TextBox 20"/>
+                <p:cNvSpPr txBox="1"/>
+                <p:nvPr/>
+              </p:nvSpPr>
+              <p:spPr>
+                <a:xfrm>
+                  <a:off x="6724580" y="1714676"/>
+                  <a:ext cx="730075" cy="637933"/>
+                </a:xfrm>
+                <a:prstGeom prst="rect">
+                  <a:avLst/>
+                </a:prstGeom>
+                <a:noFill/>
+              </p:spPr>
+              <p:txBody>
+                <a:bodyPr wrap="square" rtlCol="0">
+                  <a:spAutoFit/>
+                </a:bodyPr>
+                <a:lstStyle/>
+                <a:p>
+                  <a:pPr algn="ctr"/>
+                  <a:r>
+                    <a:rPr lang="en-GB" sz="2800" dirty="0">
+                      <a:latin typeface="Times New Roman"/>
+                      <a:cs typeface="Times New Roman"/>
+                    </a:rPr>
+                    <a:t>1</a:t>
+                  </a:r>
+                </a:p>
+              </p:txBody>
+            </p:sp>
+            <p:sp>
+              <p:nvSpPr>
+                <p:cNvPr id="22" name="TextBox 21"/>
+                <p:cNvSpPr txBox="1"/>
+                <p:nvPr/>
+              </p:nvSpPr>
+              <p:spPr>
+                <a:xfrm>
+                  <a:off x="8091665" y="2604425"/>
+                  <a:ext cx="730075" cy="637933"/>
+                </a:xfrm>
+                <a:prstGeom prst="rect">
+                  <a:avLst/>
+                </a:prstGeom>
+                <a:noFill/>
+              </p:spPr>
+              <p:txBody>
+                <a:bodyPr wrap="square" rtlCol="0">
+                  <a:spAutoFit/>
+                </a:bodyPr>
+                <a:lstStyle/>
+                <a:p>
+                  <a:pPr algn="ctr"/>
+                  <a:r>
+                    <a:rPr lang="en-GB" sz="2800" dirty="0">
+                      <a:latin typeface="Times New Roman"/>
+                      <a:cs typeface="Times New Roman"/>
+                    </a:rPr>
+                    <a:t>1</a:t>
+                  </a:r>
+                </a:p>
+              </p:txBody>
+            </p:sp>
+            <p:sp>
+              <p:nvSpPr>
+                <p:cNvPr id="23" name="TextBox 22"/>
+                <p:cNvSpPr txBox="1"/>
+                <p:nvPr/>
+              </p:nvSpPr>
+              <p:spPr>
+                <a:xfrm>
+                  <a:off x="6260978" y="3537899"/>
+                  <a:ext cx="1655773" cy="637933"/>
+                </a:xfrm>
+                <a:prstGeom prst="rect">
+                  <a:avLst/>
+                </a:prstGeom>
+                <a:noFill/>
+              </p:spPr>
+              <p:txBody>
+                <a:bodyPr wrap="square" rtlCol="0">
+                  <a:spAutoFit/>
+                </a:bodyPr>
+                <a:lstStyle/>
+                <a:p>
+                  <a:pPr algn="ctr"/>
+                  <a:r>
+                    <a:rPr lang="en-GB" sz="2800" dirty="0">
+                      <a:latin typeface="Times New Roman"/>
+                      <a:cs typeface="Times New Roman"/>
+                    </a:rPr>
+                    <a:t>e</a:t>
+                  </a:r>
+                  <a:r>
+                    <a:rPr lang="en-GB" sz="2800" baseline="30000" dirty="0" smtClean="0">
+                      <a:latin typeface="Times New Roman"/>
+                      <a:cs typeface="Times New Roman"/>
+                    </a:rPr>
+                    <a:t>-</a:t>
+                  </a:r>
+                  <a:r>
+                    <a:rPr lang="en-GB" sz="2800" baseline="30000" dirty="0" err="1" smtClean="0">
+                      <a:latin typeface="Times New Roman"/>
+                      <a:cs typeface="Times New Roman"/>
+                    </a:rPr>
+                    <a:t>jωΔt</a:t>
+                  </a:r>
+                  <a:endParaRPr lang="en-GB" sz="2800" baseline="-25000" dirty="0">
+                    <a:latin typeface="Times New Roman"/>
+                    <a:cs typeface="Times New Roman"/>
+                  </a:endParaRPr>
+                </a:p>
+              </p:txBody>
+            </p:sp>
+            <p:sp>
+              <p:nvSpPr>
+                <p:cNvPr id="24" name="TextBox 23"/>
+                <p:cNvSpPr txBox="1"/>
+                <p:nvPr/>
+              </p:nvSpPr>
+              <p:spPr>
+                <a:xfrm>
+                  <a:off x="7630169" y="4456349"/>
+                  <a:ext cx="1655773" cy="637933"/>
+                </a:xfrm>
+                <a:prstGeom prst="rect">
+                  <a:avLst/>
+                </a:prstGeom>
+                <a:noFill/>
+              </p:spPr>
+              <p:txBody>
+                <a:bodyPr wrap="square" rtlCol="0">
+                  <a:spAutoFit/>
+                </a:bodyPr>
+                <a:lstStyle/>
+                <a:p>
+                  <a:pPr algn="ctr"/>
+                  <a:r>
+                    <a:rPr lang="en-GB" sz="2800" dirty="0">
+                      <a:latin typeface="Times New Roman"/>
+                      <a:cs typeface="Times New Roman"/>
+                    </a:rPr>
+                    <a:t>e</a:t>
+                  </a:r>
+                  <a:r>
+                    <a:rPr lang="en-GB" sz="2800" baseline="30000" dirty="0" smtClean="0">
+                      <a:latin typeface="Times New Roman"/>
+                      <a:cs typeface="Times New Roman"/>
+                    </a:rPr>
+                    <a:t>-</a:t>
+                  </a:r>
+                  <a:r>
+                    <a:rPr lang="en-GB" sz="2800" baseline="30000" dirty="0" err="1" smtClean="0">
+                      <a:latin typeface="Times New Roman"/>
+                      <a:cs typeface="Times New Roman"/>
+                    </a:rPr>
+                    <a:t>jωΔt</a:t>
+                  </a:r>
+                  <a:endParaRPr lang="en-GB" sz="2800" baseline="30000" dirty="0">
+                    <a:latin typeface="Times New Roman"/>
+                    <a:cs typeface="Times New Roman"/>
+                  </a:endParaRPr>
+                </a:p>
+              </p:txBody>
+            </p:sp>
+          </p:grpSp>
+          <p:sp>
+            <p:nvSpPr>
+              <p:cNvPr id="6" name="TextBox 5"/>
+              <p:cNvSpPr txBox="1"/>
+              <p:nvPr/>
+            </p:nvSpPr>
+            <p:spPr>
+              <a:xfrm>
+                <a:off x="6175806" y="4730483"/>
+                <a:ext cx="601135" cy="337730"/>
+              </a:xfrm>
+              <a:prstGeom prst="rect">
+                <a:avLst/>
+              </a:prstGeom>
+              <a:noFill/>
+            </p:spPr>
+            <p:txBody>
+              <a:bodyPr wrap="square" rtlCol="0">
+                <a:spAutoFit/>
+              </a:bodyPr>
+              <a:lstStyle/>
+              <a:p>
+                <a:pPr algn="ctr"/>
+                <a:r>
+                  <a:rPr lang="en-GB" baseline="-25000" dirty="0" smtClean="0">
+                    <a:latin typeface="Times New Roman"/>
+                    <a:cs typeface="Times New Roman"/>
+                  </a:rPr>
+                  <a:t>2</a:t>
+                </a:r>
+                <a:endParaRPr lang="en-GB" baseline="-25000" dirty="0">
+                  <a:latin typeface="Times New Roman"/>
+                  <a:cs typeface="Times New Roman"/>
+                </a:endParaRPr>
+              </a:p>
+            </p:txBody>
+          </p:sp>
+          <p:sp>
+            <p:nvSpPr>
+              <p:cNvPr id="7" name="TextBox 6"/>
+              <p:cNvSpPr txBox="1"/>
+              <p:nvPr/>
+            </p:nvSpPr>
+            <p:spPr>
+              <a:xfrm>
+                <a:off x="4801796" y="3804676"/>
+                <a:ext cx="601135" cy="337730"/>
+              </a:xfrm>
+              <a:prstGeom prst="rect">
+                <a:avLst/>
+              </a:prstGeom>
+              <a:noFill/>
+            </p:spPr>
+            <p:txBody>
+              <a:bodyPr wrap="square" rtlCol="0">
+                <a:spAutoFit/>
+              </a:bodyPr>
+              <a:lstStyle/>
+              <a:p>
+                <a:pPr algn="ctr"/>
+                <a:r>
+                  <a:rPr lang="en-GB" baseline="-25000" dirty="0">
+                    <a:latin typeface="Times New Roman"/>
+                    <a:cs typeface="Times New Roman"/>
+                  </a:rPr>
+                  <a:t>1</a:t>
+                </a:r>
+              </a:p>
+            </p:txBody>
+          </p:sp>
+        </p:grpSp>
+        <p:grpSp>
+          <p:nvGrpSpPr>
+            <p:cNvPr id="33" name="Group 32"/>
+            <p:cNvGrpSpPr/>
+            <p:nvPr/>
+          </p:nvGrpSpPr>
+          <p:grpSpPr>
+            <a:xfrm>
+              <a:off x="2715438" y="2152390"/>
+              <a:ext cx="2418963" cy="701270"/>
+              <a:chOff x="2701238" y="2152390"/>
+              <a:chExt cx="2418963" cy="701270"/>
+            </a:xfrm>
+          </p:grpSpPr>
+          <p:sp>
+            <p:nvSpPr>
+              <p:cNvPr id="25" name="Explosion 1 24"/>
+              <p:cNvSpPr/>
+              <p:nvPr/>
+            </p:nvSpPr>
+            <p:spPr>
+              <a:xfrm>
+                <a:off x="2701238" y="2531846"/>
+                <a:ext cx="321803" cy="321814"/>
+              </a:xfrm>
+              <a:prstGeom prst="irregularSeal1">
+                <a:avLst/>
+              </a:prstGeom>
+              <a:solidFill>
+                <a:schemeClr val="tx1"/>
+              </a:solidFill>
+              <a:ln>
+                <a:noFill/>
+              </a:ln>
+              <a:effectLst/>
+            </p:spPr>
+            <p:style>
+              <a:lnRef idx="1">
+                <a:schemeClr val="accent1"/>
+              </a:lnRef>
+              <a:fillRef idx="3">
+                <a:schemeClr val="accent1"/>
+              </a:fillRef>
+              <a:effectRef idx="2">
+                <a:schemeClr val="accent1"/>
+              </a:effectRef>
+              <a:fontRef idx="minor">
+                <a:schemeClr val="lt1"/>
+              </a:fontRef>
+            </p:style>
+            <p:txBody>
+              <a:bodyPr rtlCol="0" anchor="ctr"/>
+              <a:lstStyle/>
+              <a:p>
+                <a:pPr algn="ctr"/>
+                <a:endParaRPr lang="en-GB" sz="2000"/>
+              </a:p>
+            </p:txBody>
+          </p:sp>
+          <p:sp>
+            <p:nvSpPr>
+              <p:cNvPr id="30" name="Explosion 1 29"/>
+              <p:cNvSpPr/>
+              <p:nvPr/>
+            </p:nvSpPr>
+            <p:spPr>
+              <a:xfrm>
+                <a:off x="4798398" y="2152390"/>
+                <a:ext cx="321803" cy="321814"/>
+              </a:xfrm>
+              <a:prstGeom prst="irregularSeal1">
+                <a:avLst/>
+              </a:prstGeom>
+              <a:solidFill>
+                <a:schemeClr val="tx1">
+                  <a:lumMod val="65000"/>
+                  <a:lumOff val="35000"/>
+                </a:schemeClr>
+              </a:solidFill>
+              <a:ln>
+                <a:noFill/>
+              </a:ln>
+              <a:effectLst/>
+            </p:spPr>
+            <p:style>
+              <a:lnRef idx="1">
+                <a:schemeClr val="accent1"/>
+              </a:lnRef>
+              <a:fillRef idx="3">
+                <a:schemeClr val="accent1"/>
+              </a:fillRef>
+              <a:effectRef idx="2">
+                <a:schemeClr val="accent1"/>
+              </a:effectRef>
+              <a:fontRef idx="minor">
+                <a:schemeClr val="lt1"/>
+              </a:fontRef>
+            </p:style>
+            <p:txBody>
+              <a:bodyPr rtlCol="0" anchor="ctr"/>
+              <a:lstStyle/>
+              <a:p>
+                <a:pPr algn="ctr"/>
+                <a:endParaRPr lang="en-GB" sz="2000"/>
+              </a:p>
+            </p:txBody>
+          </p:sp>
+          <p:sp>
+            <p:nvSpPr>
+              <p:cNvPr id="31" name="Explosion 1 30"/>
+              <p:cNvSpPr/>
+              <p:nvPr/>
+            </p:nvSpPr>
+            <p:spPr>
+              <a:xfrm>
+                <a:off x="4099344" y="2531846"/>
+                <a:ext cx="321803" cy="321814"/>
+              </a:xfrm>
+              <a:prstGeom prst="irregularSeal1">
+                <a:avLst/>
+              </a:prstGeom>
+              <a:solidFill>
+                <a:schemeClr val="bg1">
+                  <a:lumMod val="65000"/>
+                </a:schemeClr>
+              </a:solidFill>
+              <a:ln>
+                <a:noFill/>
+              </a:ln>
+              <a:effectLst/>
+            </p:spPr>
+            <p:style>
+              <a:lnRef idx="1">
+                <a:schemeClr val="accent1"/>
+              </a:lnRef>
+              <a:fillRef idx="3">
+                <a:schemeClr val="accent1"/>
+              </a:fillRef>
+              <a:effectRef idx="2">
+                <a:schemeClr val="accent1"/>
+              </a:effectRef>
+              <a:fontRef idx="minor">
+                <a:schemeClr val="lt1"/>
+              </a:fontRef>
+            </p:style>
+            <p:txBody>
+              <a:bodyPr rtlCol="0" anchor="ctr"/>
+              <a:lstStyle/>
+              <a:p>
+                <a:pPr algn="ctr"/>
+                <a:endParaRPr lang="en-GB" sz="2000"/>
+              </a:p>
+            </p:txBody>
+          </p:sp>
+          <p:sp>
+            <p:nvSpPr>
+              <p:cNvPr id="32" name="Explosion 1 31"/>
+              <p:cNvSpPr/>
+              <p:nvPr/>
+            </p:nvSpPr>
+            <p:spPr>
+              <a:xfrm>
+                <a:off x="3400291" y="2152390"/>
+                <a:ext cx="321803" cy="321814"/>
+              </a:xfrm>
+              <a:prstGeom prst="irregularSeal1">
+                <a:avLst/>
+              </a:prstGeom>
+              <a:solidFill>
+                <a:schemeClr val="tx1"/>
+              </a:solidFill>
+              <a:ln>
+                <a:noFill/>
+              </a:ln>
+              <a:effectLst/>
+            </p:spPr>
+            <p:style>
+              <a:lnRef idx="1">
+                <a:schemeClr val="accent1"/>
+              </a:lnRef>
+              <a:fillRef idx="3">
+                <a:schemeClr val="accent1"/>
+              </a:fillRef>
+              <a:effectRef idx="2">
+                <a:schemeClr val="accent1"/>
+              </a:effectRef>
+              <a:fontRef idx="minor">
+                <a:schemeClr val="lt1"/>
+              </a:fontRef>
+            </p:style>
+            <p:txBody>
+              <a:bodyPr rtlCol="0" anchor="ctr"/>
+              <a:lstStyle/>
+              <a:p>
+                <a:pPr algn="ctr"/>
+                <a:endParaRPr lang="en-GB" sz="2000"/>
+              </a:p>
+            </p:txBody>
+          </p:sp>
+        </p:grpSp>
+        <p:sp>
+          <p:nvSpPr>
+            <p:cNvPr id="39" name="Rectangle 38"/>
+            <p:cNvSpPr/>
+            <p:nvPr/>
+          </p:nvSpPr>
+          <p:spPr>
+            <a:xfrm>
+              <a:off x="1162019" y="2068426"/>
+              <a:ext cx="4119541" cy="773193"/>
+            </a:xfrm>
+            <a:prstGeom prst="rect">
+              <a:avLst/>
+            </a:prstGeom>
+            <a:noFill/>
+            <a:ln w="25400">
+              <a:solidFill>
+                <a:schemeClr val="tx1"/>
+              </a:solidFill>
+            </a:ln>
+            <a:effectLst/>
+          </p:spPr>
+          <p:style>
+            <a:lnRef idx="1">
+              <a:schemeClr val="accent1"/>
+            </a:lnRef>
+            <a:fillRef idx="3">
+              <a:schemeClr val="accent1"/>
+            </a:fillRef>
+            <a:effectRef idx="2">
+              <a:schemeClr val="accent1"/>
+            </a:effectRef>
+            <a:fontRef idx="minor">
+              <a:schemeClr val="lt1"/>
+            </a:fontRef>
+          </p:style>
+          <p:txBody>
+            <a:bodyPr rtlCol="0" anchor="ctr"/>
+            <a:lstStyle/>
+            <a:p>
+              <a:pPr algn="ctr"/>
+              <a:endParaRPr lang="en-GB" sz="2000"/>
+            </a:p>
+          </p:txBody>
+        </p:sp>
+        <p:sp>
+          <p:nvSpPr>
+            <p:cNvPr id="44" name="Rectangle 43"/>
+            <p:cNvSpPr/>
+            <p:nvPr/>
+          </p:nvSpPr>
+          <p:spPr>
+            <a:xfrm>
+              <a:off x="1162620" y="2452183"/>
+              <a:ext cx="1365883" cy="388934"/>
+            </a:xfrm>
+            <a:prstGeom prst="rect">
+              <a:avLst/>
+            </a:prstGeom>
+            <a:noFill/>
+            <a:ln w="19050">
+              <a:solidFill>
+                <a:schemeClr val="tx1"/>
+              </a:solidFill>
+            </a:ln>
+            <a:effectLst/>
+          </p:spPr>
+          <p:style>
+            <a:lnRef idx="1">
+              <a:schemeClr val="accent1"/>
+            </a:lnRef>
+            <a:fillRef idx="3">
+              <a:schemeClr val="accent1"/>
+            </a:fillRef>
+            <a:effectRef idx="2">
+              <a:schemeClr val="accent1"/>
+            </a:effectRef>
+            <a:fontRef idx="minor">
+              <a:schemeClr val="lt1"/>
+            </a:fontRef>
+          </p:style>
+          <p:txBody>
+            <a:bodyPr rtlCol="0" anchor="ctr"/>
+            <a:lstStyle/>
+            <a:p>
+              <a:pPr algn="ctr"/>
+              <a:endParaRPr lang="en-GB" sz="2000"/>
+            </a:p>
+          </p:txBody>
+        </p:sp>
+        <p:sp>
+          <p:nvSpPr>
+            <p:cNvPr id="56" name="Rectangle 55"/>
+            <p:cNvSpPr/>
+            <p:nvPr/>
+          </p:nvSpPr>
+          <p:spPr>
+            <a:xfrm>
+              <a:off x="1162620" y="2068426"/>
+              <a:ext cx="1365883" cy="388934"/>
+            </a:xfrm>
+            <a:prstGeom prst="rect">
+              <a:avLst/>
+            </a:prstGeom>
+            <a:noFill/>
+            <a:ln w="19050">
+              <a:solidFill>
+                <a:schemeClr val="tx1"/>
+              </a:solidFill>
+            </a:ln>
+            <a:effectLst/>
+          </p:spPr>
+          <p:style>
+            <a:lnRef idx="1">
+              <a:schemeClr val="accent1"/>
+            </a:lnRef>
+            <a:fillRef idx="3">
+              <a:schemeClr val="accent1"/>
+            </a:fillRef>
+            <a:effectRef idx="2">
+              <a:schemeClr val="accent1"/>
+            </a:effectRef>
+            <a:fontRef idx="minor">
+              <a:schemeClr val="lt1"/>
+            </a:fontRef>
+          </p:style>
+          <p:txBody>
+            <a:bodyPr rtlCol="0" anchor="ctr"/>
+            <a:lstStyle/>
+            <a:p>
+              <a:pPr algn="ctr"/>
+              <a:endParaRPr lang="en-GB" sz="2000"/>
+            </a:p>
+          </p:txBody>
+        </p:sp>
+        <p:sp>
+          <p:nvSpPr>
+            <p:cNvPr id="59" name="TextBox 58"/>
+            <p:cNvSpPr txBox="1"/>
+            <p:nvPr/>
+          </p:nvSpPr>
+          <p:spPr>
+            <a:xfrm>
+              <a:off x="1240323" y="1977954"/>
+              <a:ext cx="1237628" cy="487832"/>
+            </a:xfrm>
+            <a:prstGeom prst="rect">
+              <a:avLst/>
+            </a:prstGeom>
+            <a:noFill/>
+          </p:spPr>
+          <p:txBody>
+            <a:bodyPr wrap="square" rtlCol="0">
+              <a:spAutoFit/>
+            </a:bodyPr>
+            <a:lstStyle/>
+            <a:p>
+              <a:pPr algn="ctr"/>
+              <a:r>
+                <a:rPr lang="en-GB" sz="2000" dirty="0" smtClean="0">
+                  <a:latin typeface="Times New Roman"/>
+                  <a:cs typeface="Times New Roman"/>
+                </a:rPr>
+                <a:t>Exp. 2</a:t>
+              </a:r>
+              <a:endParaRPr lang="en-GB" sz="2000" dirty="0">
+                <a:latin typeface="Times New Roman"/>
+                <a:cs typeface="Times New Roman"/>
+              </a:endParaRPr>
+            </a:p>
+          </p:txBody>
+        </p:sp>
+        <p:sp>
+          <p:nvSpPr>
+            <p:cNvPr id="60" name="TextBox 59"/>
+            <p:cNvSpPr txBox="1"/>
+            <p:nvPr/>
+          </p:nvSpPr>
+          <p:spPr>
+            <a:xfrm>
+              <a:off x="1193860" y="2358765"/>
+              <a:ext cx="1317555" cy="487832"/>
+            </a:xfrm>
+            <a:prstGeom prst="rect">
+              <a:avLst/>
+            </a:prstGeom>
+            <a:noFill/>
+          </p:spPr>
+          <p:txBody>
+            <a:bodyPr wrap="square" rtlCol="0">
+              <a:spAutoFit/>
+            </a:bodyPr>
+            <a:lstStyle/>
+            <a:p>
+              <a:pPr algn="ctr"/>
+              <a:r>
+                <a:rPr lang="en-GB" sz="2000" dirty="0" smtClean="0">
+                  <a:latin typeface="Times New Roman"/>
+                  <a:cs typeface="Times New Roman"/>
+                </a:rPr>
+                <a:t>Exp. 1</a:t>
+              </a:r>
+              <a:endParaRPr lang="en-GB" sz="2000" dirty="0">
+                <a:latin typeface="Times New Roman"/>
+                <a:cs typeface="Times New Roman"/>
+              </a:endParaRPr>
+            </a:p>
+          </p:txBody>
+        </p:sp>
+        <p:sp>
+          <p:nvSpPr>
+            <p:cNvPr id="61" name="Rectangle 60"/>
+            <p:cNvSpPr/>
+            <p:nvPr/>
+          </p:nvSpPr>
+          <p:spPr>
+            <a:xfrm>
+              <a:off x="2528503" y="2456982"/>
+              <a:ext cx="2759019" cy="388934"/>
+            </a:xfrm>
+            <a:prstGeom prst="rect">
+              <a:avLst/>
+            </a:prstGeom>
+            <a:noFill/>
+            <a:ln w="19050">
+              <a:solidFill>
+                <a:schemeClr val="tx1"/>
+              </a:solidFill>
+            </a:ln>
+            <a:effectLst/>
+          </p:spPr>
+          <p:style>
+            <a:lnRef idx="1">
+              <a:schemeClr val="accent1"/>
+            </a:lnRef>
+            <a:fillRef idx="3">
+              <a:schemeClr val="accent1"/>
+            </a:fillRef>
+            <a:effectRef idx="2">
+              <a:schemeClr val="accent1"/>
+            </a:effectRef>
+            <a:fontRef idx="minor">
+              <a:schemeClr val="lt1"/>
+            </a:fontRef>
+          </p:style>
+          <p:txBody>
+            <a:bodyPr rtlCol="0" anchor="ctr"/>
+            <a:lstStyle/>
+            <a:p>
+              <a:pPr algn="ctr"/>
+              <a:endParaRPr lang="en-GB" sz="2000"/>
+            </a:p>
+          </p:txBody>
+        </p:sp>
+        <p:sp>
+          <p:nvSpPr>
+            <p:cNvPr id="62" name="Rectangle 61"/>
+            <p:cNvSpPr/>
+            <p:nvPr/>
+          </p:nvSpPr>
+          <p:spPr>
+            <a:xfrm>
+              <a:off x="2527300" y="2068426"/>
+              <a:ext cx="2759019" cy="388934"/>
+            </a:xfrm>
+            <a:prstGeom prst="rect">
+              <a:avLst/>
+            </a:prstGeom>
+            <a:noFill/>
+            <a:ln w="19050">
+              <a:solidFill>
+                <a:schemeClr val="tx1"/>
+              </a:solidFill>
+            </a:ln>
+            <a:effectLst/>
+          </p:spPr>
+          <p:style>
+            <a:lnRef idx="1">
+              <a:schemeClr val="accent1"/>
+            </a:lnRef>
+            <a:fillRef idx="3">
+              <a:schemeClr val="accent1"/>
+            </a:fillRef>
+            <a:effectRef idx="2">
+              <a:schemeClr val="accent1"/>
+            </a:effectRef>
+            <a:fontRef idx="minor">
+              <a:schemeClr val="lt1"/>
+            </a:fontRef>
+          </p:style>
+          <p:txBody>
+            <a:bodyPr rtlCol="0" anchor="ctr"/>
+            <a:lstStyle/>
+            <a:p>
+              <a:pPr algn="ctr"/>
+              <a:endParaRPr lang="en-GB" sz="2000"/>
+            </a:p>
+          </p:txBody>
+        </p:sp>
+      </p:grpSp>
+      <p:grpSp>
+        <p:nvGrpSpPr>
+          <p:cNvPr id="64" name="Group 63"/>
+          <p:cNvGrpSpPr/>
+          <p:nvPr/>
+        </p:nvGrpSpPr>
+        <p:grpSpPr>
+          <a:xfrm>
+            <a:off x="2079123" y="1785305"/>
+            <a:ext cx="3495182" cy="3828766"/>
+            <a:chOff x="1162019" y="1977954"/>
+            <a:chExt cx="4261483" cy="4668204"/>
+          </a:xfrm>
+          <a:scene3d>
+            <a:camera prst="isometricOffAxis2Left"/>
+            <a:lightRig rig="threePt" dir="t"/>
+          </a:scene3d>
+        </p:grpSpPr>
+        <p:grpSp>
+          <p:nvGrpSpPr>
+            <p:cNvPr id="65" name="Group 64"/>
+            <p:cNvGrpSpPr/>
+            <p:nvPr/>
+          </p:nvGrpSpPr>
+          <p:grpSpPr>
+            <a:xfrm>
+              <a:off x="2398538" y="2988051"/>
+              <a:ext cx="3024964" cy="3658107"/>
+              <a:chOff x="3790273" y="1780037"/>
+              <a:chExt cx="3024964" cy="3658107"/>
+            </a:xfrm>
+          </p:grpSpPr>
+          <p:grpSp>
+            <p:nvGrpSpPr>
+              <p:cNvPr id="78" name="Group 77"/>
+              <p:cNvGrpSpPr/>
+              <p:nvPr/>
+            </p:nvGrpSpPr>
+            <p:grpSpPr>
+              <a:xfrm>
+                <a:off x="3790273" y="1780037"/>
+                <a:ext cx="3024964" cy="3658107"/>
+                <a:chOff x="6260978" y="1597390"/>
+                <a:chExt cx="3024964" cy="3658107"/>
+              </a:xfrm>
+            </p:grpSpPr>
+            <p:sp>
+              <p:nvSpPr>
+                <p:cNvPr id="81" name="Rectangle 80"/>
+                <p:cNvSpPr/>
+                <p:nvPr/>
+              </p:nvSpPr>
+              <p:spPr>
+                <a:xfrm>
+                  <a:off x="6403367" y="1597390"/>
+                  <a:ext cx="2740633" cy="3658107"/>
+                </a:xfrm>
+                <a:prstGeom prst="rect">
+                  <a:avLst/>
+                </a:prstGeom>
+                <a:noFill/>
+                <a:ln w="25400">
+                  <a:solidFill>
+                    <a:schemeClr val="tx1"/>
+                  </a:solidFill>
+                </a:ln>
+                <a:effectLst/>
+              </p:spPr>
+              <p:style>
+                <a:lnRef idx="1">
+                  <a:schemeClr val="accent1"/>
+                </a:lnRef>
+                <a:fillRef idx="3">
+                  <a:schemeClr val="accent1"/>
+                </a:fillRef>
+                <a:effectRef idx="2">
+                  <a:schemeClr val="accent1"/>
+                </a:effectRef>
+                <a:fontRef idx="minor">
+                  <a:schemeClr val="lt1"/>
+                </a:fontRef>
+              </p:style>
+              <p:txBody>
+                <a:bodyPr rtlCol="0" anchor="ctr"/>
+                <a:lstStyle/>
+                <a:p>
+                  <a:pPr algn="ctr"/>
+                  <a:endParaRPr lang="en-GB" sz="2000"/>
+                </a:p>
+              </p:txBody>
+            </p:sp>
+            <p:sp>
+              <p:nvSpPr>
+                <p:cNvPr id="82" name="Rectangle 81"/>
+                <p:cNvSpPr/>
+                <p:nvPr/>
+              </p:nvSpPr>
+              <p:spPr>
+                <a:xfrm>
+                  <a:off x="6403968" y="1604995"/>
+                  <a:ext cx="1365883" cy="912331"/>
+                </a:xfrm>
+                <a:prstGeom prst="rect">
+                  <a:avLst/>
+                </a:prstGeom>
+                <a:noFill/>
+                <a:ln w="19050">
+                  <a:solidFill>
+                    <a:schemeClr val="tx1"/>
+                  </a:solidFill>
+                </a:ln>
+                <a:effectLst/>
+              </p:spPr>
+              <p:style>
+                <a:lnRef idx="1">
+                  <a:schemeClr val="accent1"/>
+                </a:lnRef>
+                <a:fillRef idx="3">
+                  <a:schemeClr val="accent1"/>
+                </a:fillRef>
+                <a:effectRef idx="2">
+                  <a:schemeClr val="accent1"/>
+                </a:effectRef>
+                <a:fontRef idx="minor">
+                  <a:schemeClr val="lt1"/>
+                </a:fontRef>
+              </p:style>
+              <p:txBody>
+                <a:bodyPr rtlCol="0" anchor="ctr"/>
+                <a:lstStyle/>
+                <a:p>
+                  <a:pPr algn="ctr"/>
+                  <a:endParaRPr lang="en-GB" sz="2000"/>
+                </a:p>
+              </p:txBody>
+            </p:sp>
+            <p:sp>
+              <p:nvSpPr>
+                <p:cNvPr id="83" name="Rectangle 82"/>
+                <p:cNvSpPr/>
+                <p:nvPr/>
+              </p:nvSpPr>
+              <p:spPr>
+                <a:xfrm>
+                  <a:off x="7771054" y="1604995"/>
+                  <a:ext cx="1377705" cy="912331"/>
+                </a:xfrm>
+                <a:prstGeom prst="rect">
+                  <a:avLst/>
+                </a:prstGeom>
+                <a:noFill/>
+                <a:ln w="19050">
+                  <a:solidFill>
+                    <a:schemeClr val="tx1"/>
+                  </a:solidFill>
+                </a:ln>
+                <a:effectLst/>
+              </p:spPr>
+              <p:style>
+                <a:lnRef idx="1">
+                  <a:schemeClr val="accent1"/>
+                </a:lnRef>
+                <a:fillRef idx="3">
+                  <a:schemeClr val="accent1"/>
+                </a:fillRef>
+                <a:effectRef idx="2">
+                  <a:schemeClr val="accent1"/>
+                </a:effectRef>
+                <a:fontRef idx="minor">
+                  <a:schemeClr val="lt1"/>
+                </a:fontRef>
+              </p:style>
+              <p:txBody>
+                <a:bodyPr rtlCol="0" anchor="ctr"/>
+                <a:lstStyle/>
+                <a:p>
+                  <a:pPr algn="ctr"/>
+                  <a:endParaRPr lang="en-GB" sz="2000"/>
+                </a:p>
+              </p:txBody>
+            </p:sp>
+            <p:sp>
+              <p:nvSpPr>
+                <p:cNvPr id="84" name="Rectangle 83"/>
+                <p:cNvSpPr/>
+                <p:nvPr/>
+              </p:nvSpPr>
+              <p:spPr>
+                <a:xfrm>
+                  <a:off x="6405171" y="2517326"/>
+                  <a:ext cx="1365883" cy="912331"/>
+                </a:xfrm>
+                <a:prstGeom prst="rect">
+                  <a:avLst/>
+                </a:prstGeom>
+                <a:noFill/>
+                <a:ln w="19050">
+                  <a:solidFill>
+                    <a:schemeClr val="tx1"/>
+                  </a:solidFill>
+                </a:ln>
+                <a:effectLst/>
+              </p:spPr>
+              <p:style>
+                <a:lnRef idx="1">
+                  <a:schemeClr val="accent1"/>
+                </a:lnRef>
+                <a:fillRef idx="3">
+                  <a:schemeClr val="accent1"/>
+                </a:fillRef>
+                <a:effectRef idx="2">
+                  <a:schemeClr val="accent1"/>
+                </a:effectRef>
+                <a:fontRef idx="minor">
+                  <a:schemeClr val="lt1"/>
+                </a:fontRef>
+              </p:style>
+              <p:txBody>
+                <a:bodyPr rtlCol="0" anchor="ctr"/>
+                <a:lstStyle/>
+                <a:p>
+                  <a:pPr algn="ctr"/>
+                  <a:endParaRPr lang="en-GB" sz="2000"/>
+                </a:p>
+              </p:txBody>
+            </p:sp>
+            <p:sp>
+              <p:nvSpPr>
+                <p:cNvPr id="85" name="Rectangle 84"/>
+                <p:cNvSpPr/>
+                <p:nvPr/>
+              </p:nvSpPr>
+              <p:spPr>
+                <a:xfrm>
+                  <a:off x="7772257" y="2517326"/>
+                  <a:ext cx="1377705" cy="912331"/>
+                </a:xfrm>
+                <a:prstGeom prst="rect">
+                  <a:avLst/>
+                </a:prstGeom>
+                <a:noFill/>
+                <a:ln w="19050">
+                  <a:solidFill>
+                    <a:schemeClr val="tx1"/>
+                  </a:solidFill>
+                </a:ln>
+                <a:effectLst/>
+              </p:spPr>
+              <p:style>
+                <a:lnRef idx="1">
+                  <a:schemeClr val="accent1"/>
+                </a:lnRef>
+                <a:fillRef idx="3">
+                  <a:schemeClr val="accent1"/>
+                </a:fillRef>
+                <a:effectRef idx="2">
+                  <a:schemeClr val="accent1"/>
+                </a:effectRef>
+                <a:fontRef idx="minor">
+                  <a:schemeClr val="lt1"/>
+                </a:fontRef>
+              </p:style>
+              <p:txBody>
+                <a:bodyPr rtlCol="0" anchor="ctr"/>
+                <a:lstStyle/>
+                <a:p>
+                  <a:pPr algn="ctr"/>
+                  <a:endParaRPr lang="en-GB" sz="2000"/>
+                </a:p>
+              </p:txBody>
+            </p:sp>
+            <p:sp>
+              <p:nvSpPr>
+                <p:cNvPr id="86" name="Rectangle 85"/>
+                <p:cNvSpPr/>
+                <p:nvPr/>
+              </p:nvSpPr>
+              <p:spPr>
+                <a:xfrm>
+                  <a:off x="6403968" y="4341988"/>
+                  <a:ext cx="1365883" cy="912331"/>
+                </a:xfrm>
+                <a:prstGeom prst="rect">
+                  <a:avLst/>
+                </a:prstGeom>
+                <a:noFill/>
+                <a:ln w="19050">
+                  <a:solidFill>
+                    <a:schemeClr val="tx1"/>
+                  </a:solidFill>
+                </a:ln>
+                <a:effectLst/>
+              </p:spPr>
+              <p:style>
+                <a:lnRef idx="1">
+                  <a:schemeClr val="accent1"/>
+                </a:lnRef>
+                <a:fillRef idx="3">
+                  <a:schemeClr val="accent1"/>
+                </a:fillRef>
+                <a:effectRef idx="2">
+                  <a:schemeClr val="accent1"/>
+                </a:effectRef>
+                <a:fontRef idx="minor">
+                  <a:schemeClr val="lt1"/>
+                </a:fontRef>
+              </p:style>
+              <p:txBody>
+                <a:bodyPr rtlCol="0" anchor="ctr"/>
+                <a:lstStyle/>
+                <a:p>
+                  <a:pPr algn="ctr"/>
+                  <a:endParaRPr lang="en-GB" sz="2000"/>
+                </a:p>
+              </p:txBody>
+            </p:sp>
+            <p:sp>
+              <p:nvSpPr>
+                <p:cNvPr id="87" name="Rectangle 86"/>
+                <p:cNvSpPr/>
+                <p:nvPr/>
+              </p:nvSpPr>
+              <p:spPr>
+                <a:xfrm>
+                  <a:off x="7771054" y="4341988"/>
+                  <a:ext cx="1377705" cy="912331"/>
+                </a:xfrm>
+                <a:prstGeom prst="rect">
+                  <a:avLst/>
+                </a:prstGeom>
+                <a:noFill/>
+                <a:ln w="19050">
+                  <a:solidFill>
+                    <a:schemeClr val="tx1"/>
+                  </a:solidFill>
+                </a:ln>
+                <a:effectLst/>
+              </p:spPr>
+              <p:style>
+                <a:lnRef idx="1">
+                  <a:schemeClr val="accent1"/>
+                </a:lnRef>
+                <a:fillRef idx="3">
+                  <a:schemeClr val="accent1"/>
+                </a:fillRef>
+                <a:effectRef idx="2">
+                  <a:schemeClr val="accent1"/>
+                </a:effectRef>
+                <a:fontRef idx="minor">
+                  <a:schemeClr val="lt1"/>
+                </a:fontRef>
+              </p:style>
+              <p:txBody>
+                <a:bodyPr rtlCol="0" anchor="ctr"/>
+                <a:lstStyle/>
+                <a:p>
+                  <a:pPr algn="ctr"/>
+                  <a:endParaRPr lang="en-GB" sz="2000"/>
+                </a:p>
+              </p:txBody>
+            </p:sp>
+            <p:sp>
+              <p:nvSpPr>
+                <p:cNvPr id="88" name="Rectangle 87"/>
+                <p:cNvSpPr/>
+                <p:nvPr/>
+              </p:nvSpPr>
+              <p:spPr>
+                <a:xfrm>
+                  <a:off x="6403968" y="3429657"/>
+                  <a:ext cx="1365883" cy="912331"/>
+                </a:xfrm>
+                <a:prstGeom prst="rect">
+                  <a:avLst/>
+                </a:prstGeom>
+                <a:noFill/>
+                <a:ln w="19050">
+                  <a:solidFill>
+                    <a:schemeClr val="tx1"/>
+                  </a:solidFill>
+                </a:ln>
+                <a:effectLst/>
+              </p:spPr>
+              <p:style>
+                <a:lnRef idx="1">
+                  <a:schemeClr val="accent1"/>
+                </a:lnRef>
+                <a:fillRef idx="3">
+                  <a:schemeClr val="accent1"/>
+                </a:fillRef>
+                <a:effectRef idx="2">
+                  <a:schemeClr val="accent1"/>
+                </a:effectRef>
+                <a:fontRef idx="minor">
+                  <a:schemeClr val="lt1"/>
+                </a:fontRef>
+              </p:style>
+              <p:txBody>
+                <a:bodyPr rtlCol="0" anchor="ctr"/>
+                <a:lstStyle/>
+                <a:p>
+                  <a:pPr algn="ctr"/>
+                  <a:endParaRPr lang="en-GB" sz="2000"/>
+                </a:p>
+              </p:txBody>
+            </p:sp>
+            <p:sp>
+              <p:nvSpPr>
+                <p:cNvPr id="89" name="Rectangle 88"/>
+                <p:cNvSpPr/>
+                <p:nvPr/>
+              </p:nvSpPr>
+              <p:spPr>
+                <a:xfrm>
+                  <a:off x="7771054" y="3429657"/>
+                  <a:ext cx="1377705" cy="912331"/>
+                </a:xfrm>
+                <a:prstGeom prst="rect">
+                  <a:avLst/>
+                </a:prstGeom>
+                <a:noFill/>
+                <a:ln w="19050">
+                  <a:solidFill>
+                    <a:schemeClr val="tx1"/>
+                  </a:solidFill>
+                </a:ln>
+                <a:effectLst/>
+              </p:spPr>
+              <p:style>
+                <a:lnRef idx="1">
+                  <a:schemeClr val="accent1"/>
+                </a:lnRef>
+                <a:fillRef idx="3">
+                  <a:schemeClr val="accent1"/>
+                </a:fillRef>
+                <a:effectRef idx="2">
+                  <a:schemeClr val="accent1"/>
+                </a:effectRef>
+                <a:fontRef idx="minor">
+                  <a:schemeClr val="lt1"/>
+                </a:fontRef>
+              </p:style>
+              <p:txBody>
+                <a:bodyPr rtlCol="0" anchor="ctr"/>
+                <a:lstStyle/>
+                <a:p>
+                  <a:pPr algn="ctr"/>
+                  <a:endParaRPr lang="en-GB" sz="2000"/>
+                </a:p>
+              </p:txBody>
+            </p:sp>
+            <p:sp>
+              <p:nvSpPr>
+                <p:cNvPr id="90" name="TextBox 89"/>
+                <p:cNvSpPr txBox="1"/>
+                <p:nvPr/>
+              </p:nvSpPr>
+              <p:spPr>
+                <a:xfrm>
+                  <a:off x="8091665" y="1695375"/>
+                  <a:ext cx="730075" cy="637933"/>
+                </a:xfrm>
+                <a:prstGeom prst="rect">
+                  <a:avLst/>
+                </a:prstGeom>
+                <a:noFill/>
+              </p:spPr>
+              <p:txBody>
+                <a:bodyPr wrap="square" rtlCol="0">
+                  <a:spAutoFit/>
+                </a:bodyPr>
+                <a:lstStyle/>
+                <a:p>
+                  <a:pPr algn="ctr"/>
+                  <a:r>
+                    <a:rPr lang="en-GB" sz="2800" dirty="0" smtClean="0">
+                      <a:latin typeface="Times New Roman"/>
+                      <a:cs typeface="Times New Roman"/>
+                    </a:rPr>
+                    <a:t>0</a:t>
+                  </a:r>
+                  <a:endParaRPr lang="en-GB" sz="2800" dirty="0">
+                    <a:latin typeface="Times New Roman"/>
+                    <a:cs typeface="Times New Roman"/>
+                  </a:endParaRPr>
+                </a:p>
+              </p:txBody>
+            </p:sp>
+            <p:sp>
+              <p:nvSpPr>
+                <p:cNvPr id="91" name="TextBox 90"/>
+                <p:cNvSpPr txBox="1"/>
+                <p:nvPr/>
+              </p:nvSpPr>
+              <p:spPr>
+                <a:xfrm>
+                  <a:off x="6723377" y="4456349"/>
+                  <a:ext cx="730075" cy="637933"/>
+                </a:xfrm>
+                <a:prstGeom prst="rect">
+                  <a:avLst/>
+                </a:prstGeom>
+                <a:noFill/>
+              </p:spPr>
+              <p:txBody>
+                <a:bodyPr wrap="square" rtlCol="0">
+                  <a:spAutoFit/>
+                </a:bodyPr>
+                <a:lstStyle/>
+                <a:p>
+                  <a:pPr algn="ctr"/>
+                  <a:r>
+                    <a:rPr lang="en-GB" sz="2800" dirty="0" smtClean="0">
+                      <a:latin typeface="Times New Roman"/>
+                      <a:cs typeface="Times New Roman"/>
+                    </a:rPr>
+                    <a:t>0</a:t>
+                  </a:r>
+                  <a:endParaRPr lang="en-GB" sz="2800" dirty="0">
+                    <a:latin typeface="Times New Roman"/>
+                    <a:cs typeface="Times New Roman"/>
+                  </a:endParaRPr>
+                </a:p>
+              </p:txBody>
+            </p:sp>
+            <p:sp>
+              <p:nvSpPr>
+                <p:cNvPr id="92" name="TextBox 91"/>
+                <p:cNvSpPr txBox="1"/>
+                <p:nvPr/>
+              </p:nvSpPr>
+              <p:spPr>
+                <a:xfrm>
+                  <a:off x="6724580" y="2601668"/>
+                  <a:ext cx="730075" cy="637933"/>
+                </a:xfrm>
+                <a:prstGeom prst="rect">
+                  <a:avLst/>
+                </a:prstGeom>
+                <a:noFill/>
+              </p:spPr>
+              <p:txBody>
+                <a:bodyPr wrap="square" rtlCol="0">
+                  <a:spAutoFit/>
+                </a:bodyPr>
+                <a:lstStyle/>
+                <a:p>
+                  <a:pPr algn="ctr"/>
+                  <a:r>
+                    <a:rPr lang="en-GB" sz="2800" dirty="0" smtClean="0">
+                      <a:latin typeface="Times New Roman"/>
+                      <a:cs typeface="Times New Roman"/>
+                    </a:rPr>
+                    <a:t>0</a:t>
+                  </a:r>
+                  <a:endParaRPr lang="en-GB" sz="2800" dirty="0">
+                    <a:latin typeface="Times New Roman"/>
+                    <a:cs typeface="Times New Roman"/>
+                  </a:endParaRPr>
+                </a:p>
+              </p:txBody>
+            </p:sp>
+            <p:sp>
+              <p:nvSpPr>
+                <p:cNvPr id="93" name="TextBox 92"/>
+                <p:cNvSpPr txBox="1"/>
+                <p:nvPr/>
+              </p:nvSpPr>
+              <p:spPr>
+                <a:xfrm>
+                  <a:off x="8091665" y="3537899"/>
+                  <a:ext cx="730075" cy="637933"/>
+                </a:xfrm>
+                <a:prstGeom prst="rect">
+                  <a:avLst/>
+                </a:prstGeom>
+                <a:noFill/>
+              </p:spPr>
+              <p:txBody>
+                <a:bodyPr wrap="square" rtlCol="0">
+                  <a:spAutoFit/>
+                </a:bodyPr>
+                <a:lstStyle/>
+                <a:p>
+                  <a:pPr algn="ctr"/>
+                  <a:r>
+                    <a:rPr lang="en-GB" sz="2800" dirty="0" smtClean="0"/>
+                    <a:t>0</a:t>
+                  </a:r>
+                  <a:endParaRPr lang="en-GB" sz="2800" dirty="0"/>
+                </a:p>
+              </p:txBody>
+            </p:sp>
+            <p:sp>
+              <p:nvSpPr>
+                <p:cNvPr id="94" name="TextBox 93"/>
+                <p:cNvSpPr txBox="1"/>
+                <p:nvPr/>
+              </p:nvSpPr>
+              <p:spPr>
+                <a:xfrm>
+                  <a:off x="6724580" y="1714676"/>
+                  <a:ext cx="730075" cy="637933"/>
+                </a:xfrm>
+                <a:prstGeom prst="rect">
+                  <a:avLst/>
+                </a:prstGeom>
+                <a:noFill/>
+              </p:spPr>
+              <p:txBody>
+                <a:bodyPr wrap="square" rtlCol="0">
+                  <a:spAutoFit/>
+                </a:bodyPr>
+                <a:lstStyle/>
+                <a:p>
+                  <a:pPr algn="ctr"/>
+                  <a:r>
+                    <a:rPr lang="en-GB" sz="2800" dirty="0">
+                      <a:latin typeface="Times New Roman"/>
+                      <a:cs typeface="Times New Roman"/>
+                    </a:rPr>
+                    <a:t>1</a:t>
+                  </a:r>
+                </a:p>
+              </p:txBody>
+            </p:sp>
+            <p:sp>
+              <p:nvSpPr>
+                <p:cNvPr id="95" name="TextBox 94"/>
+                <p:cNvSpPr txBox="1"/>
+                <p:nvPr/>
+              </p:nvSpPr>
+              <p:spPr>
+                <a:xfrm>
+                  <a:off x="8091665" y="2604425"/>
+                  <a:ext cx="730075" cy="637933"/>
+                </a:xfrm>
+                <a:prstGeom prst="rect">
+                  <a:avLst/>
+                </a:prstGeom>
+                <a:noFill/>
+              </p:spPr>
+              <p:txBody>
+                <a:bodyPr wrap="square" rtlCol="0">
+                  <a:spAutoFit/>
+                </a:bodyPr>
+                <a:lstStyle/>
+                <a:p>
+                  <a:pPr algn="ctr"/>
+                  <a:r>
+                    <a:rPr lang="en-GB" sz="2800" dirty="0">
+                      <a:latin typeface="Times New Roman"/>
+                      <a:cs typeface="Times New Roman"/>
+                    </a:rPr>
+                    <a:t>1</a:t>
+                  </a:r>
+                </a:p>
+              </p:txBody>
+            </p:sp>
+            <p:sp>
+              <p:nvSpPr>
+                <p:cNvPr id="96" name="TextBox 95"/>
+                <p:cNvSpPr txBox="1"/>
+                <p:nvPr/>
+              </p:nvSpPr>
+              <p:spPr>
+                <a:xfrm>
+                  <a:off x="6260978" y="3537899"/>
+                  <a:ext cx="1655773" cy="637933"/>
+                </a:xfrm>
+                <a:prstGeom prst="rect">
+                  <a:avLst/>
+                </a:prstGeom>
+                <a:noFill/>
+              </p:spPr>
+              <p:txBody>
+                <a:bodyPr wrap="square" rtlCol="0">
+                  <a:spAutoFit/>
+                </a:bodyPr>
+                <a:lstStyle/>
+                <a:p>
+                  <a:pPr algn="ctr"/>
+                  <a:r>
+                    <a:rPr lang="en-GB" sz="2800" dirty="0">
+                      <a:latin typeface="Times New Roman"/>
+                      <a:cs typeface="Times New Roman"/>
+                    </a:rPr>
+                    <a:t>e</a:t>
+                  </a:r>
+                  <a:r>
+                    <a:rPr lang="en-GB" sz="2800" baseline="30000" dirty="0" smtClean="0">
+                      <a:latin typeface="Times New Roman"/>
+                      <a:cs typeface="Times New Roman"/>
+                    </a:rPr>
+                    <a:t>-</a:t>
+                  </a:r>
+                  <a:r>
+                    <a:rPr lang="en-GB" sz="2800" baseline="30000" dirty="0" err="1" smtClean="0">
+                      <a:latin typeface="Times New Roman"/>
+                      <a:cs typeface="Times New Roman"/>
+                    </a:rPr>
+                    <a:t>jωΔt</a:t>
+                  </a:r>
+                  <a:endParaRPr lang="en-GB" sz="2800" baseline="-25000" dirty="0">
+                    <a:latin typeface="Times New Roman"/>
+                    <a:cs typeface="Times New Roman"/>
+                  </a:endParaRPr>
+                </a:p>
+              </p:txBody>
+            </p:sp>
+            <p:sp>
+              <p:nvSpPr>
+                <p:cNvPr id="97" name="TextBox 96"/>
+                <p:cNvSpPr txBox="1"/>
+                <p:nvPr/>
+              </p:nvSpPr>
+              <p:spPr>
+                <a:xfrm>
+                  <a:off x="7630169" y="4456349"/>
+                  <a:ext cx="1655773" cy="637933"/>
+                </a:xfrm>
+                <a:prstGeom prst="rect">
+                  <a:avLst/>
+                </a:prstGeom>
+                <a:noFill/>
+              </p:spPr>
+              <p:txBody>
+                <a:bodyPr wrap="square" rtlCol="0">
+                  <a:spAutoFit/>
+                </a:bodyPr>
+                <a:lstStyle/>
+                <a:p>
+                  <a:pPr algn="ctr"/>
+                  <a:r>
+                    <a:rPr lang="en-GB" sz="2800" dirty="0">
+                      <a:latin typeface="Times New Roman"/>
+                      <a:cs typeface="Times New Roman"/>
+                    </a:rPr>
+                    <a:t>e</a:t>
+                  </a:r>
+                  <a:r>
+                    <a:rPr lang="en-GB" sz="2800" baseline="30000" dirty="0" smtClean="0">
+                      <a:latin typeface="Times New Roman"/>
+                      <a:cs typeface="Times New Roman"/>
+                    </a:rPr>
+                    <a:t>-</a:t>
+                  </a:r>
+                  <a:r>
+                    <a:rPr lang="en-GB" sz="2800" baseline="30000" dirty="0" err="1" smtClean="0">
+                      <a:latin typeface="Times New Roman"/>
+                      <a:cs typeface="Times New Roman"/>
+                    </a:rPr>
+                    <a:t>jωΔt</a:t>
+                  </a:r>
+                  <a:endParaRPr lang="en-GB" sz="2800" baseline="30000" dirty="0">
+                    <a:latin typeface="Times New Roman"/>
+                    <a:cs typeface="Times New Roman"/>
+                  </a:endParaRPr>
+                </a:p>
+              </p:txBody>
+            </p:sp>
+          </p:grpSp>
+          <p:sp>
+            <p:nvSpPr>
+              <p:cNvPr id="79" name="TextBox 78"/>
+              <p:cNvSpPr txBox="1"/>
+              <p:nvPr/>
+            </p:nvSpPr>
+            <p:spPr>
+              <a:xfrm>
+                <a:off x="6194690" y="4739925"/>
+                <a:ext cx="601135" cy="337730"/>
+              </a:xfrm>
+              <a:prstGeom prst="rect">
+                <a:avLst/>
+              </a:prstGeom>
+              <a:noFill/>
+            </p:spPr>
+            <p:txBody>
+              <a:bodyPr wrap="square" rtlCol="0">
+                <a:spAutoFit/>
+              </a:bodyPr>
+              <a:lstStyle/>
+              <a:p>
+                <a:pPr algn="ctr"/>
+                <a:r>
+                  <a:rPr lang="en-GB" baseline="-25000" dirty="0">
+                    <a:latin typeface="Times New Roman"/>
+                    <a:cs typeface="Times New Roman"/>
+                  </a:rPr>
+                  <a:t>4</a:t>
+                </a:r>
+              </a:p>
+            </p:txBody>
+          </p:sp>
+          <p:sp>
+            <p:nvSpPr>
+              <p:cNvPr id="80" name="TextBox 79"/>
+              <p:cNvSpPr txBox="1"/>
+              <p:nvPr/>
+            </p:nvSpPr>
+            <p:spPr>
+              <a:xfrm>
+                <a:off x="4811238" y="3814118"/>
+                <a:ext cx="601135" cy="337730"/>
+              </a:xfrm>
+              <a:prstGeom prst="rect">
+                <a:avLst/>
+              </a:prstGeom>
+              <a:noFill/>
+            </p:spPr>
+            <p:txBody>
+              <a:bodyPr wrap="square" rtlCol="0">
+                <a:spAutoFit/>
+              </a:bodyPr>
+              <a:lstStyle/>
+              <a:p>
+                <a:pPr algn="ctr"/>
+                <a:r>
+                  <a:rPr lang="en-GB" baseline="-25000" dirty="0">
+                    <a:latin typeface="Times New Roman"/>
+                    <a:cs typeface="Times New Roman"/>
+                  </a:rPr>
+                  <a:t>3</a:t>
+                </a:r>
+              </a:p>
+            </p:txBody>
+          </p:sp>
+        </p:grpSp>
+        <p:grpSp>
+          <p:nvGrpSpPr>
+            <p:cNvPr id="66" name="Group 65"/>
+            <p:cNvGrpSpPr/>
+            <p:nvPr/>
+          </p:nvGrpSpPr>
+          <p:grpSpPr>
+            <a:xfrm>
+              <a:off x="2715438" y="2152390"/>
+              <a:ext cx="2418963" cy="701270"/>
+              <a:chOff x="2701238" y="2152390"/>
+              <a:chExt cx="2418963" cy="701270"/>
+            </a:xfrm>
+          </p:grpSpPr>
+          <p:sp>
+            <p:nvSpPr>
+              <p:cNvPr id="74" name="Explosion 1 73"/>
+              <p:cNvSpPr/>
+              <p:nvPr/>
+            </p:nvSpPr>
+            <p:spPr>
+              <a:xfrm>
+                <a:off x="2701238" y="2531846"/>
+                <a:ext cx="321803" cy="321814"/>
+              </a:xfrm>
+              <a:prstGeom prst="irregularSeal1">
+                <a:avLst/>
+              </a:prstGeom>
+              <a:solidFill>
+                <a:schemeClr val="tx1"/>
+              </a:solidFill>
+              <a:ln>
+                <a:noFill/>
+              </a:ln>
+              <a:effectLst/>
+            </p:spPr>
+            <p:style>
+              <a:lnRef idx="1">
+                <a:schemeClr val="accent1"/>
+              </a:lnRef>
+              <a:fillRef idx="3">
+                <a:schemeClr val="accent1"/>
+              </a:fillRef>
+              <a:effectRef idx="2">
+                <a:schemeClr val="accent1"/>
+              </a:effectRef>
+              <a:fontRef idx="minor">
+                <a:schemeClr val="lt1"/>
+              </a:fontRef>
+            </p:style>
+            <p:txBody>
+              <a:bodyPr rtlCol="0" anchor="ctr"/>
+              <a:lstStyle/>
+              <a:p>
+                <a:pPr algn="ctr"/>
+                <a:endParaRPr lang="en-GB" sz="2000"/>
+              </a:p>
+            </p:txBody>
+          </p:sp>
+          <p:sp>
+            <p:nvSpPr>
+              <p:cNvPr id="75" name="Explosion 1 74"/>
+              <p:cNvSpPr/>
+              <p:nvPr/>
+            </p:nvSpPr>
+            <p:spPr>
+              <a:xfrm>
+                <a:off x="4798398" y="2152390"/>
+                <a:ext cx="321803" cy="321814"/>
+              </a:xfrm>
+              <a:prstGeom prst="irregularSeal1">
+                <a:avLst/>
+              </a:prstGeom>
+              <a:solidFill>
+                <a:schemeClr val="tx1">
+                  <a:lumMod val="65000"/>
+                  <a:lumOff val="35000"/>
+                </a:schemeClr>
+              </a:solidFill>
+              <a:ln>
+                <a:noFill/>
+              </a:ln>
+              <a:effectLst/>
+            </p:spPr>
+            <p:style>
+              <a:lnRef idx="1">
+                <a:schemeClr val="accent1"/>
+              </a:lnRef>
+              <a:fillRef idx="3">
+                <a:schemeClr val="accent1"/>
+              </a:fillRef>
+              <a:effectRef idx="2">
+                <a:schemeClr val="accent1"/>
+              </a:effectRef>
+              <a:fontRef idx="minor">
+                <a:schemeClr val="lt1"/>
+              </a:fontRef>
+            </p:style>
+            <p:txBody>
+              <a:bodyPr rtlCol="0" anchor="ctr"/>
+              <a:lstStyle/>
+              <a:p>
+                <a:pPr algn="ctr"/>
+                <a:endParaRPr lang="en-GB" sz="2000"/>
+              </a:p>
+            </p:txBody>
+          </p:sp>
+          <p:sp>
+            <p:nvSpPr>
+              <p:cNvPr id="76" name="Explosion 1 75"/>
+              <p:cNvSpPr/>
+              <p:nvPr/>
+            </p:nvSpPr>
+            <p:spPr>
+              <a:xfrm>
+                <a:off x="4099344" y="2531846"/>
+                <a:ext cx="321803" cy="321814"/>
+              </a:xfrm>
+              <a:prstGeom prst="irregularSeal1">
+                <a:avLst/>
+              </a:prstGeom>
+              <a:solidFill>
+                <a:schemeClr val="bg1">
+                  <a:lumMod val="65000"/>
+                </a:schemeClr>
+              </a:solidFill>
+              <a:ln>
+                <a:noFill/>
+              </a:ln>
+              <a:effectLst/>
+            </p:spPr>
+            <p:style>
+              <a:lnRef idx="1">
+                <a:schemeClr val="accent1"/>
+              </a:lnRef>
+              <a:fillRef idx="3">
+                <a:schemeClr val="accent1"/>
+              </a:fillRef>
+              <a:effectRef idx="2">
+                <a:schemeClr val="accent1"/>
+              </a:effectRef>
+              <a:fontRef idx="minor">
+                <a:schemeClr val="lt1"/>
+              </a:fontRef>
+            </p:style>
+            <p:txBody>
+              <a:bodyPr rtlCol="0" anchor="ctr"/>
+              <a:lstStyle/>
+              <a:p>
+                <a:pPr algn="ctr"/>
+                <a:endParaRPr lang="en-GB" sz="2000"/>
+              </a:p>
+            </p:txBody>
+          </p:sp>
+          <p:sp>
+            <p:nvSpPr>
+              <p:cNvPr id="77" name="Explosion 1 76"/>
+              <p:cNvSpPr/>
+              <p:nvPr/>
+            </p:nvSpPr>
+            <p:spPr>
+              <a:xfrm>
+                <a:off x="3400291" y="2152390"/>
+                <a:ext cx="321803" cy="321814"/>
+              </a:xfrm>
+              <a:prstGeom prst="irregularSeal1">
+                <a:avLst/>
+              </a:prstGeom>
+              <a:solidFill>
+                <a:schemeClr val="tx1"/>
+              </a:solidFill>
+              <a:ln>
+                <a:noFill/>
+              </a:ln>
+              <a:effectLst/>
+            </p:spPr>
+            <p:style>
+              <a:lnRef idx="1">
+                <a:schemeClr val="accent1"/>
+              </a:lnRef>
+              <a:fillRef idx="3">
+                <a:schemeClr val="accent1"/>
+              </a:fillRef>
+              <a:effectRef idx="2">
+                <a:schemeClr val="accent1"/>
+              </a:effectRef>
+              <a:fontRef idx="minor">
+                <a:schemeClr val="lt1"/>
+              </a:fontRef>
+            </p:style>
+            <p:txBody>
+              <a:bodyPr rtlCol="0" anchor="ctr"/>
+              <a:lstStyle/>
+              <a:p>
+                <a:pPr algn="ctr"/>
+                <a:endParaRPr lang="en-GB" sz="2000"/>
+              </a:p>
+            </p:txBody>
+          </p:sp>
+        </p:grpSp>
+        <p:sp>
+          <p:nvSpPr>
+            <p:cNvPr id="67" name="Rectangle 66"/>
+            <p:cNvSpPr/>
+            <p:nvPr/>
+          </p:nvSpPr>
+          <p:spPr>
+            <a:xfrm>
+              <a:off x="1162019" y="2068426"/>
+              <a:ext cx="4119541" cy="773193"/>
+            </a:xfrm>
+            <a:prstGeom prst="rect">
+              <a:avLst/>
+            </a:prstGeom>
+            <a:noFill/>
+            <a:ln w="25400">
+              <a:solidFill>
+                <a:schemeClr val="tx1"/>
+              </a:solidFill>
+            </a:ln>
+            <a:effectLst/>
+          </p:spPr>
+          <p:style>
+            <a:lnRef idx="1">
+              <a:schemeClr val="accent1"/>
+            </a:lnRef>
+            <a:fillRef idx="3">
+              <a:schemeClr val="accent1"/>
+            </a:fillRef>
+            <a:effectRef idx="2">
+              <a:schemeClr val="accent1"/>
+            </a:effectRef>
+            <a:fontRef idx="minor">
+              <a:schemeClr val="lt1"/>
+            </a:fontRef>
+          </p:style>
+          <p:txBody>
+            <a:bodyPr rtlCol="0" anchor="ctr"/>
+            <a:lstStyle/>
+            <a:p>
+              <a:pPr algn="ctr"/>
+              <a:endParaRPr lang="en-GB" sz="2000"/>
+            </a:p>
+          </p:txBody>
+        </p:sp>
+        <p:sp>
+          <p:nvSpPr>
+            <p:cNvPr id="68" name="Rectangle 67"/>
+            <p:cNvSpPr/>
+            <p:nvPr/>
+          </p:nvSpPr>
+          <p:spPr>
+            <a:xfrm>
+              <a:off x="1162620" y="2452183"/>
+              <a:ext cx="1365883" cy="388934"/>
+            </a:xfrm>
+            <a:prstGeom prst="rect">
+              <a:avLst/>
+            </a:prstGeom>
+            <a:noFill/>
+            <a:ln w="19050">
+              <a:solidFill>
+                <a:schemeClr val="tx1"/>
+              </a:solidFill>
+            </a:ln>
+            <a:effectLst/>
+          </p:spPr>
+          <p:style>
+            <a:lnRef idx="1">
+              <a:schemeClr val="accent1"/>
+            </a:lnRef>
+            <a:fillRef idx="3">
+              <a:schemeClr val="accent1"/>
+            </a:fillRef>
+            <a:effectRef idx="2">
+              <a:schemeClr val="accent1"/>
+            </a:effectRef>
+            <a:fontRef idx="minor">
+              <a:schemeClr val="lt1"/>
+            </a:fontRef>
+          </p:style>
+          <p:txBody>
+            <a:bodyPr rtlCol="0" anchor="ctr"/>
+            <a:lstStyle/>
+            <a:p>
+              <a:pPr algn="ctr"/>
+              <a:endParaRPr lang="en-GB" sz="2000"/>
+            </a:p>
+          </p:txBody>
+        </p:sp>
+        <p:sp>
+          <p:nvSpPr>
+            <p:cNvPr id="69" name="Rectangle 68"/>
+            <p:cNvSpPr/>
+            <p:nvPr/>
+          </p:nvSpPr>
+          <p:spPr>
+            <a:xfrm>
+              <a:off x="1162620" y="2068426"/>
+              <a:ext cx="1365883" cy="388934"/>
+            </a:xfrm>
+            <a:prstGeom prst="rect">
+              <a:avLst/>
+            </a:prstGeom>
+            <a:noFill/>
+            <a:ln w="19050">
+              <a:solidFill>
+                <a:schemeClr val="tx1"/>
+              </a:solidFill>
+            </a:ln>
+            <a:effectLst/>
+          </p:spPr>
+          <p:style>
+            <a:lnRef idx="1">
+              <a:schemeClr val="accent1"/>
+            </a:lnRef>
+            <a:fillRef idx="3">
+              <a:schemeClr val="accent1"/>
+            </a:fillRef>
+            <a:effectRef idx="2">
+              <a:schemeClr val="accent1"/>
+            </a:effectRef>
+            <a:fontRef idx="minor">
+              <a:schemeClr val="lt1"/>
+            </a:fontRef>
+          </p:style>
+          <p:txBody>
+            <a:bodyPr rtlCol="0" anchor="ctr"/>
+            <a:lstStyle/>
+            <a:p>
+              <a:pPr algn="ctr"/>
+              <a:endParaRPr lang="en-GB" sz="2000"/>
+            </a:p>
+          </p:txBody>
+        </p:sp>
+        <p:sp>
+          <p:nvSpPr>
+            <p:cNvPr id="70" name="TextBox 69"/>
+            <p:cNvSpPr txBox="1"/>
+            <p:nvPr/>
+          </p:nvSpPr>
+          <p:spPr>
+            <a:xfrm>
+              <a:off x="1240323" y="1977954"/>
+              <a:ext cx="1237628" cy="487832"/>
+            </a:xfrm>
+            <a:prstGeom prst="rect">
+              <a:avLst/>
+            </a:prstGeom>
+            <a:noFill/>
+          </p:spPr>
+          <p:txBody>
+            <a:bodyPr wrap="square" rtlCol="0">
+              <a:spAutoFit/>
+            </a:bodyPr>
+            <a:lstStyle/>
+            <a:p>
+              <a:pPr algn="ctr"/>
+              <a:r>
+                <a:rPr lang="en-GB" sz="2000" dirty="0" smtClean="0">
+                  <a:latin typeface="Times New Roman"/>
+                  <a:cs typeface="Times New Roman"/>
+                </a:rPr>
+                <a:t>Exp. </a:t>
+              </a:r>
+              <a:r>
+                <a:rPr lang="en-GB" sz="2000" dirty="0">
+                  <a:latin typeface="Times New Roman"/>
+                  <a:cs typeface="Times New Roman"/>
+                </a:rPr>
+                <a:t>4</a:t>
+              </a:r>
+            </a:p>
+          </p:txBody>
+        </p:sp>
+        <p:sp>
+          <p:nvSpPr>
+            <p:cNvPr id="71" name="TextBox 70"/>
+            <p:cNvSpPr txBox="1"/>
+            <p:nvPr/>
+          </p:nvSpPr>
+          <p:spPr>
+            <a:xfrm>
+              <a:off x="1193860" y="2358766"/>
+              <a:ext cx="1317555" cy="487832"/>
+            </a:xfrm>
+            <a:prstGeom prst="rect">
+              <a:avLst/>
+            </a:prstGeom>
+            <a:noFill/>
+          </p:spPr>
+          <p:txBody>
+            <a:bodyPr wrap="square" rtlCol="0">
+              <a:spAutoFit/>
+            </a:bodyPr>
+            <a:lstStyle/>
+            <a:p>
+              <a:pPr algn="ctr"/>
+              <a:r>
+                <a:rPr lang="en-GB" sz="2000" dirty="0" smtClean="0">
+                  <a:latin typeface="Times New Roman"/>
+                  <a:cs typeface="Times New Roman"/>
+                </a:rPr>
+                <a:t>Exp. 3</a:t>
+              </a:r>
+              <a:endParaRPr lang="en-GB" sz="2000" dirty="0">
+                <a:latin typeface="Times New Roman"/>
+                <a:cs typeface="Times New Roman"/>
+              </a:endParaRPr>
+            </a:p>
+          </p:txBody>
+        </p:sp>
+        <p:sp>
+          <p:nvSpPr>
+            <p:cNvPr id="72" name="Rectangle 71"/>
+            <p:cNvSpPr/>
+            <p:nvPr/>
+          </p:nvSpPr>
+          <p:spPr>
+            <a:xfrm>
+              <a:off x="2528503" y="2456982"/>
+              <a:ext cx="2759019" cy="388934"/>
+            </a:xfrm>
+            <a:prstGeom prst="rect">
+              <a:avLst/>
+            </a:prstGeom>
+            <a:noFill/>
+            <a:ln w="19050">
+              <a:solidFill>
+                <a:schemeClr val="tx1"/>
+              </a:solidFill>
+            </a:ln>
+            <a:effectLst/>
+          </p:spPr>
+          <p:style>
+            <a:lnRef idx="1">
+              <a:schemeClr val="accent1"/>
+            </a:lnRef>
+            <a:fillRef idx="3">
+              <a:schemeClr val="accent1"/>
+            </a:fillRef>
+            <a:effectRef idx="2">
+              <a:schemeClr val="accent1"/>
+            </a:effectRef>
+            <a:fontRef idx="minor">
+              <a:schemeClr val="lt1"/>
+            </a:fontRef>
+          </p:style>
+          <p:txBody>
+            <a:bodyPr rtlCol="0" anchor="ctr"/>
+            <a:lstStyle/>
+            <a:p>
+              <a:pPr algn="ctr"/>
+              <a:endParaRPr lang="en-GB" sz="2000"/>
+            </a:p>
+          </p:txBody>
+        </p:sp>
+        <p:sp>
+          <p:nvSpPr>
+            <p:cNvPr id="73" name="Rectangle 72"/>
+            <p:cNvSpPr/>
+            <p:nvPr/>
+          </p:nvSpPr>
+          <p:spPr>
+            <a:xfrm>
+              <a:off x="2527300" y="2068426"/>
+              <a:ext cx="2759019" cy="388934"/>
+            </a:xfrm>
+            <a:prstGeom prst="rect">
+              <a:avLst/>
+            </a:prstGeom>
+            <a:noFill/>
+            <a:ln w="19050">
+              <a:solidFill>
+                <a:schemeClr val="tx1"/>
+              </a:solidFill>
+            </a:ln>
+            <a:effectLst/>
+          </p:spPr>
+          <p:style>
+            <a:lnRef idx="1">
+              <a:schemeClr val="accent1"/>
+            </a:lnRef>
+            <a:fillRef idx="3">
+              <a:schemeClr val="accent1"/>
+            </a:fillRef>
+            <a:effectRef idx="2">
+              <a:schemeClr val="accent1"/>
+            </a:effectRef>
+            <a:fontRef idx="minor">
+              <a:schemeClr val="lt1"/>
+            </a:fontRef>
+          </p:style>
+          <p:txBody>
+            <a:bodyPr rtlCol="0" anchor="ctr"/>
+            <a:lstStyle/>
+            <a:p>
+              <a:pPr algn="ctr"/>
+              <a:endParaRPr lang="en-GB" sz="2000"/>
+            </a:p>
+          </p:txBody>
+        </p:sp>
+      </p:grpSp>
+      <p:grpSp>
+        <p:nvGrpSpPr>
+          <p:cNvPr id="98" name="Group 97"/>
+          <p:cNvGrpSpPr/>
+          <p:nvPr/>
+        </p:nvGrpSpPr>
+        <p:grpSpPr>
+          <a:xfrm>
+            <a:off x="4266883" y="779265"/>
+            <a:ext cx="3495182" cy="3828766"/>
+            <a:chOff x="1162019" y="1977954"/>
+            <a:chExt cx="4261483" cy="4668204"/>
+          </a:xfrm>
+          <a:scene3d>
+            <a:camera prst="isometricOffAxis2Left"/>
+            <a:lightRig rig="threePt" dir="t"/>
+          </a:scene3d>
+        </p:grpSpPr>
+        <p:grpSp>
+          <p:nvGrpSpPr>
+            <p:cNvPr id="99" name="Group 98"/>
+            <p:cNvGrpSpPr/>
+            <p:nvPr/>
+          </p:nvGrpSpPr>
+          <p:grpSpPr>
+            <a:xfrm>
+              <a:off x="2398538" y="2988051"/>
+              <a:ext cx="3024964" cy="3658107"/>
+              <a:chOff x="3790273" y="1780037"/>
+              <a:chExt cx="3024964" cy="3658107"/>
+            </a:xfrm>
+          </p:grpSpPr>
+          <p:grpSp>
+            <p:nvGrpSpPr>
+              <p:cNvPr id="112" name="Group 111"/>
+              <p:cNvGrpSpPr/>
+              <p:nvPr/>
+            </p:nvGrpSpPr>
+            <p:grpSpPr>
+              <a:xfrm>
+                <a:off x="3790273" y="1780037"/>
+                <a:ext cx="3024964" cy="3658107"/>
+                <a:chOff x="6260978" y="1597390"/>
+                <a:chExt cx="3024964" cy="3658107"/>
+              </a:xfrm>
+            </p:grpSpPr>
+            <p:sp>
+              <p:nvSpPr>
+                <p:cNvPr id="115" name="Rectangle 114"/>
+                <p:cNvSpPr/>
+                <p:nvPr/>
+              </p:nvSpPr>
+              <p:spPr>
+                <a:xfrm>
+                  <a:off x="6403367" y="1597390"/>
+                  <a:ext cx="2740633" cy="3658107"/>
+                </a:xfrm>
+                <a:prstGeom prst="rect">
+                  <a:avLst/>
+                </a:prstGeom>
+                <a:noFill/>
+                <a:ln w="25400">
+                  <a:solidFill>
+                    <a:schemeClr val="tx1"/>
+                  </a:solidFill>
+                </a:ln>
+                <a:effectLst/>
+              </p:spPr>
+              <p:style>
+                <a:lnRef idx="1">
+                  <a:schemeClr val="accent1"/>
+                </a:lnRef>
+                <a:fillRef idx="3">
+                  <a:schemeClr val="accent1"/>
+                </a:fillRef>
+                <a:effectRef idx="2">
+                  <a:schemeClr val="accent1"/>
+                </a:effectRef>
+                <a:fontRef idx="minor">
+                  <a:schemeClr val="lt1"/>
+                </a:fontRef>
+              </p:style>
+              <p:txBody>
+                <a:bodyPr rtlCol="0" anchor="ctr"/>
+                <a:lstStyle/>
+                <a:p>
+                  <a:pPr algn="ctr"/>
+                  <a:endParaRPr lang="en-GB" sz="2000"/>
+                </a:p>
+              </p:txBody>
+            </p:sp>
+            <p:sp>
+              <p:nvSpPr>
+                <p:cNvPr id="116" name="Rectangle 115"/>
+                <p:cNvSpPr/>
+                <p:nvPr/>
+              </p:nvSpPr>
+              <p:spPr>
+                <a:xfrm>
+                  <a:off x="6403968" y="1604995"/>
+                  <a:ext cx="1365883" cy="912331"/>
+                </a:xfrm>
+                <a:prstGeom prst="rect">
+                  <a:avLst/>
+                </a:prstGeom>
+                <a:noFill/>
+                <a:ln w="19050">
+                  <a:solidFill>
+                    <a:schemeClr val="tx1"/>
+                  </a:solidFill>
+                </a:ln>
+                <a:effectLst/>
+              </p:spPr>
+              <p:style>
+                <a:lnRef idx="1">
+                  <a:schemeClr val="accent1"/>
+                </a:lnRef>
+                <a:fillRef idx="3">
+                  <a:schemeClr val="accent1"/>
+                </a:fillRef>
+                <a:effectRef idx="2">
+                  <a:schemeClr val="accent1"/>
+                </a:effectRef>
+                <a:fontRef idx="minor">
+                  <a:schemeClr val="lt1"/>
+                </a:fontRef>
+              </p:style>
+              <p:txBody>
+                <a:bodyPr rtlCol="0" anchor="ctr"/>
+                <a:lstStyle/>
+                <a:p>
+                  <a:pPr algn="ctr"/>
+                  <a:endParaRPr lang="en-GB" sz="2000"/>
+                </a:p>
+              </p:txBody>
+            </p:sp>
+            <p:sp>
+              <p:nvSpPr>
+                <p:cNvPr id="117" name="Rectangle 116"/>
+                <p:cNvSpPr/>
+                <p:nvPr/>
+              </p:nvSpPr>
+              <p:spPr>
+                <a:xfrm>
+                  <a:off x="7771054" y="1604995"/>
+                  <a:ext cx="1377705" cy="912331"/>
+                </a:xfrm>
+                <a:prstGeom prst="rect">
+                  <a:avLst/>
+                </a:prstGeom>
+                <a:noFill/>
+                <a:ln w="19050">
+                  <a:solidFill>
+                    <a:schemeClr val="tx1"/>
+                  </a:solidFill>
+                </a:ln>
+                <a:effectLst/>
+              </p:spPr>
+              <p:style>
+                <a:lnRef idx="1">
+                  <a:schemeClr val="accent1"/>
+                </a:lnRef>
+                <a:fillRef idx="3">
+                  <a:schemeClr val="accent1"/>
+                </a:fillRef>
+                <a:effectRef idx="2">
+                  <a:schemeClr val="accent1"/>
+                </a:effectRef>
+                <a:fontRef idx="minor">
+                  <a:schemeClr val="lt1"/>
+                </a:fontRef>
+              </p:style>
+              <p:txBody>
+                <a:bodyPr rtlCol="0" anchor="ctr"/>
+                <a:lstStyle/>
+                <a:p>
+                  <a:pPr algn="ctr"/>
+                  <a:endParaRPr lang="en-GB" sz="2000"/>
+                </a:p>
+              </p:txBody>
+            </p:sp>
+            <p:sp>
+              <p:nvSpPr>
+                <p:cNvPr id="118" name="Rectangle 117"/>
+                <p:cNvSpPr/>
+                <p:nvPr/>
+              </p:nvSpPr>
+              <p:spPr>
+                <a:xfrm>
+                  <a:off x="6405171" y="2517326"/>
+                  <a:ext cx="1365883" cy="912331"/>
+                </a:xfrm>
+                <a:prstGeom prst="rect">
+                  <a:avLst/>
+                </a:prstGeom>
+                <a:noFill/>
+                <a:ln w="19050">
+                  <a:solidFill>
+                    <a:schemeClr val="tx1"/>
+                  </a:solidFill>
+                </a:ln>
+                <a:effectLst/>
+              </p:spPr>
+              <p:style>
+                <a:lnRef idx="1">
+                  <a:schemeClr val="accent1"/>
+                </a:lnRef>
+                <a:fillRef idx="3">
+                  <a:schemeClr val="accent1"/>
+                </a:fillRef>
+                <a:effectRef idx="2">
+                  <a:schemeClr val="accent1"/>
+                </a:effectRef>
+                <a:fontRef idx="minor">
+                  <a:schemeClr val="lt1"/>
+                </a:fontRef>
+              </p:style>
+              <p:txBody>
+                <a:bodyPr rtlCol="0" anchor="ctr"/>
+                <a:lstStyle/>
+                <a:p>
+                  <a:pPr algn="ctr"/>
+                  <a:endParaRPr lang="en-GB" sz="2000"/>
+                </a:p>
+              </p:txBody>
+            </p:sp>
+            <p:sp>
+              <p:nvSpPr>
+                <p:cNvPr id="119" name="Rectangle 118"/>
+                <p:cNvSpPr/>
+                <p:nvPr/>
+              </p:nvSpPr>
+              <p:spPr>
+                <a:xfrm>
+                  <a:off x="7772257" y="2517326"/>
+                  <a:ext cx="1377705" cy="912331"/>
+                </a:xfrm>
+                <a:prstGeom prst="rect">
+                  <a:avLst/>
+                </a:prstGeom>
+                <a:noFill/>
+                <a:ln w="19050">
+                  <a:solidFill>
+                    <a:schemeClr val="tx1"/>
+                  </a:solidFill>
+                </a:ln>
+                <a:effectLst/>
+              </p:spPr>
+              <p:style>
+                <a:lnRef idx="1">
+                  <a:schemeClr val="accent1"/>
+                </a:lnRef>
+                <a:fillRef idx="3">
+                  <a:schemeClr val="accent1"/>
+                </a:fillRef>
+                <a:effectRef idx="2">
+                  <a:schemeClr val="accent1"/>
+                </a:effectRef>
+                <a:fontRef idx="minor">
+                  <a:schemeClr val="lt1"/>
+                </a:fontRef>
+              </p:style>
+              <p:txBody>
+                <a:bodyPr rtlCol="0" anchor="ctr"/>
+                <a:lstStyle/>
+                <a:p>
+                  <a:pPr algn="ctr"/>
+                  <a:endParaRPr lang="en-GB" sz="2000"/>
+                </a:p>
+              </p:txBody>
+            </p:sp>
+            <p:sp>
+              <p:nvSpPr>
+                <p:cNvPr id="120" name="Rectangle 119"/>
+                <p:cNvSpPr/>
+                <p:nvPr/>
+              </p:nvSpPr>
+              <p:spPr>
+                <a:xfrm>
+                  <a:off x="6403968" y="4341988"/>
+                  <a:ext cx="1365883" cy="912331"/>
+                </a:xfrm>
+                <a:prstGeom prst="rect">
+                  <a:avLst/>
+                </a:prstGeom>
+                <a:noFill/>
+                <a:ln w="19050">
+                  <a:solidFill>
+                    <a:schemeClr val="tx1"/>
+                  </a:solidFill>
+                </a:ln>
+                <a:effectLst/>
+              </p:spPr>
+              <p:style>
+                <a:lnRef idx="1">
+                  <a:schemeClr val="accent1"/>
+                </a:lnRef>
+                <a:fillRef idx="3">
+                  <a:schemeClr val="accent1"/>
+                </a:fillRef>
+                <a:effectRef idx="2">
+                  <a:schemeClr val="accent1"/>
+                </a:effectRef>
+                <a:fontRef idx="minor">
+                  <a:schemeClr val="lt1"/>
+                </a:fontRef>
+              </p:style>
+              <p:txBody>
+                <a:bodyPr rtlCol="0" anchor="ctr"/>
+                <a:lstStyle/>
+                <a:p>
+                  <a:pPr algn="ctr"/>
+                  <a:endParaRPr lang="en-GB" sz="2000"/>
+                </a:p>
+              </p:txBody>
+            </p:sp>
+            <p:sp>
+              <p:nvSpPr>
+                <p:cNvPr id="121" name="Rectangle 120"/>
+                <p:cNvSpPr/>
+                <p:nvPr/>
+              </p:nvSpPr>
+              <p:spPr>
+                <a:xfrm>
+                  <a:off x="7771054" y="4341988"/>
+                  <a:ext cx="1377705" cy="912331"/>
+                </a:xfrm>
+                <a:prstGeom prst="rect">
+                  <a:avLst/>
+                </a:prstGeom>
+                <a:noFill/>
+                <a:ln w="19050">
+                  <a:solidFill>
+                    <a:schemeClr val="tx1"/>
+                  </a:solidFill>
+                </a:ln>
+                <a:effectLst/>
+              </p:spPr>
+              <p:style>
+                <a:lnRef idx="1">
+                  <a:schemeClr val="accent1"/>
+                </a:lnRef>
+                <a:fillRef idx="3">
+                  <a:schemeClr val="accent1"/>
+                </a:fillRef>
+                <a:effectRef idx="2">
+                  <a:schemeClr val="accent1"/>
+                </a:effectRef>
+                <a:fontRef idx="minor">
+                  <a:schemeClr val="lt1"/>
+                </a:fontRef>
+              </p:style>
+              <p:txBody>
+                <a:bodyPr rtlCol="0" anchor="ctr"/>
+                <a:lstStyle/>
+                <a:p>
+                  <a:pPr algn="ctr"/>
+                  <a:endParaRPr lang="en-GB" sz="2000"/>
+                </a:p>
+              </p:txBody>
+            </p:sp>
+            <p:sp>
+              <p:nvSpPr>
+                <p:cNvPr id="122" name="Rectangle 121"/>
+                <p:cNvSpPr/>
+                <p:nvPr/>
+              </p:nvSpPr>
+              <p:spPr>
+                <a:xfrm>
+                  <a:off x="6403968" y="3429657"/>
+                  <a:ext cx="1365883" cy="912331"/>
+                </a:xfrm>
+                <a:prstGeom prst="rect">
+                  <a:avLst/>
+                </a:prstGeom>
+                <a:noFill/>
+                <a:ln w="19050">
+                  <a:solidFill>
+                    <a:schemeClr val="tx1"/>
+                  </a:solidFill>
+                </a:ln>
+                <a:effectLst/>
+              </p:spPr>
+              <p:style>
+                <a:lnRef idx="1">
+                  <a:schemeClr val="accent1"/>
+                </a:lnRef>
+                <a:fillRef idx="3">
+                  <a:schemeClr val="accent1"/>
+                </a:fillRef>
+                <a:effectRef idx="2">
+                  <a:schemeClr val="accent1"/>
+                </a:effectRef>
+                <a:fontRef idx="minor">
+                  <a:schemeClr val="lt1"/>
+                </a:fontRef>
+              </p:style>
+              <p:txBody>
+                <a:bodyPr rtlCol="0" anchor="ctr"/>
+                <a:lstStyle/>
+                <a:p>
+                  <a:pPr algn="ctr"/>
+                  <a:endParaRPr lang="en-GB" sz="2000"/>
+                </a:p>
+              </p:txBody>
+            </p:sp>
+            <p:sp>
+              <p:nvSpPr>
+                <p:cNvPr id="123" name="Rectangle 122"/>
+                <p:cNvSpPr/>
+                <p:nvPr/>
+              </p:nvSpPr>
+              <p:spPr>
+                <a:xfrm>
+                  <a:off x="7771054" y="3429657"/>
+                  <a:ext cx="1377705" cy="912331"/>
+                </a:xfrm>
+                <a:prstGeom prst="rect">
+                  <a:avLst/>
+                </a:prstGeom>
+                <a:noFill/>
+                <a:ln w="19050">
+                  <a:solidFill>
+                    <a:schemeClr val="tx1"/>
+                  </a:solidFill>
+                </a:ln>
+                <a:effectLst/>
+              </p:spPr>
+              <p:style>
+                <a:lnRef idx="1">
+                  <a:schemeClr val="accent1"/>
+                </a:lnRef>
+                <a:fillRef idx="3">
+                  <a:schemeClr val="accent1"/>
+                </a:fillRef>
+                <a:effectRef idx="2">
+                  <a:schemeClr val="accent1"/>
+                </a:effectRef>
+                <a:fontRef idx="minor">
+                  <a:schemeClr val="lt1"/>
+                </a:fontRef>
+              </p:style>
+              <p:txBody>
+                <a:bodyPr rtlCol="0" anchor="ctr"/>
+                <a:lstStyle/>
+                <a:p>
+                  <a:pPr algn="ctr"/>
+                  <a:endParaRPr lang="en-GB" sz="2000"/>
+                </a:p>
+              </p:txBody>
+            </p:sp>
+            <p:sp>
+              <p:nvSpPr>
+                <p:cNvPr id="124" name="TextBox 123"/>
+                <p:cNvSpPr txBox="1"/>
+                <p:nvPr/>
+              </p:nvSpPr>
+              <p:spPr>
+                <a:xfrm>
+                  <a:off x="8091665" y="1695375"/>
+                  <a:ext cx="730075" cy="637933"/>
+                </a:xfrm>
+                <a:prstGeom prst="rect">
+                  <a:avLst/>
+                </a:prstGeom>
+                <a:noFill/>
+              </p:spPr>
+              <p:txBody>
+                <a:bodyPr wrap="square" rtlCol="0">
+                  <a:spAutoFit/>
+                </a:bodyPr>
+                <a:lstStyle/>
+                <a:p>
+                  <a:pPr algn="ctr"/>
+                  <a:r>
+                    <a:rPr lang="en-GB" sz="2800" dirty="0" smtClean="0">
+                      <a:latin typeface="Times New Roman"/>
+                      <a:cs typeface="Times New Roman"/>
+                    </a:rPr>
+                    <a:t>0</a:t>
+                  </a:r>
+                  <a:endParaRPr lang="en-GB" sz="2800" dirty="0">
+                    <a:latin typeface="Times New Roman"/>
+                    <a:cs typeface="Times New Roman"/>
+                  </a:endParaRPr>
+                </a:p>
+              </p:txBody>
+            </p:sp>
+            <p:sp>
+              <p:nvSpPr>
+                <p:cNvPr id="125" name="TextBox 124"/>
+                <p:cNvSpPr txBox="1"/>
+                <p:nvPr/>
+              </p:nvSpPr>
+              <p:spPr>
+                <a:xfrm>
+                  <a:off x="6723377" y="4456349"/>
+                  <a:ext cx="730075" cy="637933"/>
+                </a:xfrm>
+                <a:prstGeom prst="rect">
+                  <a:avLst/>
+                </a:prstGeom>
+                <a:noFill/>
+              </p:spPr>
+              <p:txBody>
+                <a:bodyPr wrap="square" rtlCol="0">
+                  <a:spAutoFit/>
+                </a:bodyPr>
+                <a:lstStyle/>
+                <a:p>
+                  <a:pPr algn="ctr"/>
+                  <a:r>
+                    <a:rPr lang="en-GB" sz="2800" dirty="0" smtClean="0">
+                      <a:latin typeface="Times New Roman"/>
+                      <a:cs typeface="Times New Roman"/>
+                    </a:rPr>
+                    <a:t>0</a:t>
+                  </a:r>
+                  <a:endParaRPr lang="en-GB" sz="2800" dirty="0">
+                    <a:latin typeface="Times New Roman"/>
+                    <a:cs typeface="Times New Roman"/>
+                  </a:endParaRPr>
+                </a:p>
+              </p:txBody>
+            </p:sp>
+            <p:sp>
+              <p:nvSpPr>
+                <p:cNvPr id="126" name="TextBox 125"/>
+                <p:cNvSpPr txBox="1"/>
+                <p:nvPr/>
+              </p:nvSpPr>
+              <p:spPr>
+                <a:xfrm>
+                  <a:off x="6724580" y="2601668"/>
+                  <a:ext cx="730075" cy="637933"/>
+                </a:xfrm>
+                <a:prstGeom prst="rect">
+                  <a:avLst/>
+                </a:prstGeom>
+                <a:noFill/>
+              </p:spPr>
+              <p:txBody>
+                <a:bodyPr wrap="square" rtlCol="0">
+                  <a:spAutoFit/>
+                </a:bodyPr>
+                <a:lstStyle/>
+                <a:p>
+                  <a:pPr algn="ctr"/>
+                  <a:r>
+                    <a:rPr lang="en-GB" sz="2800" dirty="0" smtClean="0">
+                      <a:latin typeface="Times New Roman"/>
+                      <a:cs typeface="Times New Roman"/>
+                    </a:rPr>
+                    <a:t>0</a:t>
+                  </a:r>
+                  <a:endParaRPr lang="en-GB" sz="2800" dirty="0">
+                    <a:latin typeface="Times New Roman"/>
+                    <a:cs typeface="Times New Roman"/>
+                  </a:endParaRPr>
+                </a:p>
+              </p:txBody>
+            </p:sp>
+            <p:sp>
+              <p:nvSpPr>
+                <p:cNvPr id="127" name="TextBox 126"/>
+                <p:cNvSpPr txBox="1"/>
+                <p:nvPr/>
+              </p:nvSpPr>
+              <p:spPr>
+                <a:xfrm>
+                  <a:off x="8091665" y="3537899"/>
+                  <a:ext cx="730075" cy="637933"/>
+                </a:xfrm>
+                <a:prstGeom prst="rect">
+                  <a:avLst/>
+                </a:prstGeom>
+                <a:noFill/>
+              </p:spPr>
+              <p:txBody>
+                <a:bodyPr wrap="square" rtlCol="0">
+                  <a:spAutoFit/>
+                </a:bodyPr>
+                <a:lstStyle/>
+                <a:p>
+                  <a:pPr algn="ctr"/>
+                  <a:r>
+                    <a:rPr lang="en-GB" sz="2800" dirty="0" smtClean="0"/>
+                    <a:t>0</a:t>
+                  </a:r>
+                  <a:endParaRPr lang="en-GB" sz="2800" dirty="0"/>
+                </a:p>
+              </p:txBody>
+            </p:sp>
+            <p:sp>
+              <p:nvSpPr>
+                <p:cNvPr id="128" name="TextBox 127"/>
+                <p:cNvSpPr txBox="1"/>
+                <p:nvPr/>
+              </p:nvSpPr>
+              <p:spPr>
+                <a:xfrm>
+                  <a:off x="6724580" y="1714676"/>
+                  <a:ext cx="730075" cy="637933"/>
+                </a:xfrm>
+                <a:prstGeom prst="rect">
+                  <a:avLst/>
+                </a:prstGeom>
+                <a:noFill/>
+              </p:spPr>
+              <p:txBody>
+                <a:bodyPr wrap="square" rtlCol="0">
+                  <a:spAutoFit/>
+                </a:bodyPr>
+                <a:lstStyle/>
+                <a:p>
+                  <a:pPr algn="ctr"/>
+                  <a:r>
+                    <a:rPr lang="en-GB" sz="2800" dirty="0">
+                      <a:latin typeface="Times New Roman"/>
+                      <a:cs typeface="Times New Roman"/>
+                    </a:rPr>
+                    <a:t>1</a:t>
+                  </a:r>
+                </a:p>
+              </p:txBody>
+            </p:sp>
+            <p:sp>
+              <p:nvSpPr>
+                <p:cNvPr id="129" name="TextBox 128"/>
+                <p:cNvSpPr txBox="1"/>
+                <p:nvPr/>
+              </p:nvSpPr>
+              <p:spPr>
+                <a:xfrm>
+                  <a:off x="8091665" y="2604425"/>
+                  <a:ext cx="730075" cy="637933"/>
+                </a:xfrm>
+                <a:prstGeom prst="rect">
+                  <a:avLst/>
+                </a:prstGeom>
+                <a:noFill/>
+              </p:spPr>
+              <p:txBody>
+                <a:bodyPr wrap="square" rtlCol="0">
+                  <a:spAutoFit/>
+                </a:bodyPr>
+                <a:lstStyle/>
+                <a:p>
+                  <a:pPr algn="ctr"/>
+                  <a:r>
+                    <a:rPr lang="en-GB" sz="2800" dirty="0">
+                      <a:latin typeface="Times New Roman"/>
+                      <a:cs typeface="Times New Roman"/>
+                    </a:rPr>
+                    <a:t>1</a:t>
+                  </a:r>
+                </a:p>
+              </p:txBody>
+            </p:sp>
+            <p:sp>
+              <p:nvSpPr>
+                <p:cNvPr id="130" name="TextBox 129"/>
+                <p:cNvSpPr txBox="1"/>
+                <p:nvPr/>
+              </p:nvSpPr>
+              <p:spPr>
+                <a:xfrm>
+                  <a:off x="6260978" y="3537899"/>
+                  <a:ext cx="1655773" cy="637933"/>
+                </a:xfrm>
+                <a:prstGeom prst="rect">
+                  <a:avLst/>
+                </a:prstGeom>
+                <a:noFill/>
+              </p:spPr>
+              <p:txBody>
+                <a:bodyPr wrap="square" rtlCol="0">
+                  <a:spAutoFit/>
+                </a:bodyPr>
+                <a:lstStyle/>
+                <a:p>
+                  <a:pPr algn="ctr"/>
+                  <a:r>
+                    <a:rPr lang="en-GB" sz="2800" dirty="0">
+                      <a:latin typeface="Times New Roman"/>
+                      <a:cs typeface="Times New Roman"/>
+                    </a:rPr>
+                    <a:t>e</a:t>
+                  </a:r>
+                  <a:r>
+                    <a:rPr lang="en-GB" sz="2800" baseline="30000" dirty="0" smtClean="0">
+                      <a:latin typeface="Times New Roman"/>
+                      <a:cs typeface="Times New Roman"/>
+                    </a:rPr>
+                    <a:t>-</a:t>
+                  </a:r>
+                  <a:r>
+                    <a:rPr lang="en-GB" sz="2800" baseline="30000" dirty="0" err="1" smtClean="0">
+                      <a:latin typeface="Times New Roman"/>
+                      <a:cs typeface="Times New Roman"/>
+                    </a:rPr>
+                    <a:t>jωΔt</a:t>
+                  </a:r>
+                  <a:endParaRPr lang="en-GB" sz="2800" baseline="-25000" dirty="0">
+                    <a:latin typeface="Times New Roman"/>
+                    <a:cs typeface="Times New Roman"/>
+                  </a:endParaRPr>
+                </a:p>
+              </p:txBody>
+            </p:sp>
+            <p:sp>
+              <p:nvSpPr>
+                <p:cNvPr id="131" name="TextBox 130"/>
+                <p:cNvSpPr txBox="1"/>
+                <p:nvPr/>
+              </p:nvSpPr>
+              <p:spPr>
+                <a:xfrm>
+                  <a:off x="7630169" y="4456349"/>
+                  <a:ext cx="1655773" cy="637933"/>
+                </a:xfrm>
+                <a:prstGeom prst="rect">
+                  <a:avLst/>
+                </a:prstGeom>
+                <a:noFill/>
+              </p:spPr>
+              <p:txBody>
+                <a:bodyPr wrap="square" rtlCol="0">
+                  <a:spAutoFit/>
+                </a:bodyPr>
+                <a:lstStyle/>
+                <a:p>
+                  <a:pPr algn="ctr"/>
+                  <a:r>
+                    <a:rPr lang="en-GB" sz="2800" dirty="0">
+                      <a:latin typeface="Times New Roman"/>
+                      <a:cs typeface="Times New Roman"/>
+                    </a:rPr>
+                    <a:t>e</a:t>
+                  </a:r>
+                  <a:r>
+                    <a:rPr lang="en-GB" sz="2800" baseline="30000" dirty="0" smtClean="0">
+                      <a:latin typeface="Times New Roman"/>
+                      <a:cs typeface="Times New Roman"/>
+                    </a:rPr>
+                    <a:t>-</a:t>
+                  </a:r>
+                  <a:r>
+                    <a:rPr lang="en-GB" sz="2800" baseline="30000" dirty="0" err="1" smtClean="0">
+                      <a:latin typeface="Times New Roman"/>
+                      <a:cs typeface="Times New Roman"/>
+                    </a:rPr>
+                    <a:t>jωΔt</a:t>
+                  </a:r>
+                  <a:endParaRPr lang="en-GB" sz="2800" baseline="30000" dirty="0">
+                    <a:latin typeface="Times New Roman"/>
+                    <a:cs typeface="Times New Roman"/>
+                  </a:endParaRPr>
+                </a:p>
+              </p:txBody>
+            </p:sp>
+          </p:grpSp>
+          <p:sp>
+            <p:nvSpPr>
+              <p:cNvPr id="113" name="TextBox 112"/>
+              <p:cNvSpPr txBox="1"/>
+              <p:nvPr/>
+            </p:nvSpPr>
+            <p:spPr>
+              <a:xfrm>
+                <a:off x="6185248" y="4730483"/>
+                <a:ext cx="601135" cy="337730"/>
+              </a:xfrm>
+              <a:prstGeom prst="rect">
+                <a:avLst/>
+              </a:prstGeom>
+              <a:noFill/>
+            </p:spPr>
+            <p:txBody>
+              <a:bodyPr wrap="square" rtlCol="0">
+                <a:spAutoFit/>
+              </a:bodyPr>
+              <a:lstStyle/>
+              <a:p>
+                <a:pPr algn="ctr"/>
+                <a:r>
+                  <a:rPr lang="en-GB" baseline="-25000" dirty="0" smtClean="0">
+                    <a:latin typeface="Times New Roman"/>
+                    <a:cs typeface="Times New Roman"/>
+                  </a:rPr>
+                  <a:t>6</a:t>
+                </a:r>
+                <a:endParaRPr lang="en-GB" baseline="-25000" dirty="0">
+                  <a:latin typeface="Times New Roman"/>
+                  <a:cs typeface="Times New Roman"/>
+                </a:endParaRPr>
+              </a:p>
+            </p:txBody>
+          </p:sp>
+          <p:sp>
+            <p:nvSpPr>
+              <p:cNvPr id="114" name="TextBox 113"/>
+              <p:cNvSpPr txBox="1"/>
+              <p:nvPr/>
+            </p:nvSpPr>
+            <p:spPr>
+              <a:xfrm>
+                <a:off x="4811238" y="3804676"/>
+                <a:ext cx="601135" cy="337730"/>
+              </a:xfrm>
+              <a:prstGeom prst="rect">
+                <a:avLst/>
+              </a:prstGeom>
+              <a:noFill/>
+            </p:spPr>
+            <p:txBody>
+              <a:bodyPr wrap="square" rtlCol="0">
+                <a:spAutoFit/>
+              </a:bodyPr>
+              <a:lstStyle/>
+              <a:p>
+                <a:pPr algn="ctr"/>
+                <a:r>
+                  <a:rPr lang="en-GB" baseline="-25000" dirty="0">
+                    <a:latin typeface="Times New Roman"/>
+                    <a:cs typeface="Times New Roman"/>
+                  </a:rPr>
+                  <a:t>5</a:t>
+                </a:r>
+              </a:p>
+            </p:txBody>
+          </p:sp>
+        </p:grpSp>
+        <p:grpSp>
+          <p:nvGrpSpPr>
+            <p:cNvPr id="100" name="Group 99"/>
+            <p:cNvGrpSpPr/>
+            <p:nvPr/>
+          </p:nvGrpSpPr>
+          <p:grpSpPr>
+            <a:xfrm>
+              <a:off x="2715438" y="2152390"/>
+              <a:ext cx="2418963" cy="701270"/>
+              <a:chOff x="2701238" y="2152390"/>
+              <a:chExt cx="2418963" cy="701270"/>
+            </a:xfrm>
+          </p:grpSpPr>
+          <p:sp>
+            <p:nvSpPr>
+              <p:cNvPr id="108" name="Explosion 1 107"/>
+              <p:cNvSpPr/>
+              <p:nvPr/>
+            </p:nvSpPr>
+            <p:spPr>
+              <a:xfrm>
+                <a:off x="2701238" y="2531846"/>
+                <a:ext cx="321803" cy="321814"/>
+              </a:xfrm>
+              <a:prstGeom prst="irregularSeal1">
+                <a:avLst/>
+              </a:prstGeom>
+              <a:solidFill>
+                <a:schemeClr val="tx1"/>
+              </a:solidFill>
+              <a:ln>
+                <a:noFill/>
+              </a:ln>
+              <a:effectLst/>
+            </p:spPr>
+            <p:style>
+              <a:lnRef idx="1">
+                <a:schemeClr val="accent1"/>
+              </a:lnRef>
+              <a:fillRef idx="3">
+                <a:schemeClr val="accent1"/>
+              </a:fillRef>
+              <a:effectRef idx="2">
+                <a:schemeClr val="accent1"/>
+              </a:effectRef>
+              <a:fontRef idx="minor">
+                <a:schemeClr val="lt1"/>
+              </a:fontRef>
+            </p:style>
+            <p:txBody>
+              <a:bodyPr rtlCol="0" anchor="ctr"/>
+              <a:lstStyle/>
+              <a:p>
+                <a:pPr algn="ctr"/>
+                <a:endParaRPr lang="en-GB" sz="2000"/>
+              </a:p>
+            </p:txBody>
+          </p:sp>
+          <p:sp>
+            <p:nvSpPr>
+              <p:cNvPr id="109" name="Explosion 1 108"/>
+              <p:cNvSpPr/>
+              <p:nvPr/>
+            </p:nvSpPr>
+            <p:spPr>
+              <a:xfrm>
+                <a:off x="4798398" y="2152390"/>
+                <a:ext cx="321803" cy="321814"/>
+              </a:xfrm>
+              <a:prstGeom prst="irregularSeal1">
+                <a:avLst/>
+              </a:prstGeom>
+              <a:solidFill>
+                <a:schemeClr val="tx1">
+                  <a:lumMod val="65000"/>
+                  <a:lumOff val="35000"/>
+                </a:schemeClr>
+              </a:solidFill>
+              <a:ln>
+                <a:noFill/>
+              </a:ln>
+              <a:effectLst/>
+            </p:spPr>
+            <p:style>
+              <a:lnRef idx="1">
+                <a:schemeClr val="accent1"/>
+              </a:lnRef>
+              <a:fillRef idx="3">
+                <a:schemeClr val="accent1"/>
+              </a:fillRef>
+              <a:effectRef idx="2">
+                <a:schemeClr val="accent1"/>
+              </a:effectRef>
+              <a:fontRef idx="minor">
+                <a:schemeClr val="lt1"/>
+              </a:fontRef>
+            </p:style>
+            <p:txBody>
+              <a:bodyPr rtlCol="0" anchor="ctr"/>
+              <a:lstStyle/>
+              <a:p>
+                <a:pPr algn="ctr"/>
+                <a:endParaRPr lang="en-GB" sz="2000"/>
+              </a:p>
+            </p:txBody>
+          </p:sp>
+          <p:sp>
+            <p:nvSpPr>
+              <p:cNvPr id="110" name="Explosion 1 109"/>
+              <p:cNvSpPr/>
+              <p:nvPr/>
+            </p:nvSpPr>
+            <p:spPr>
+              <a:xfrm>
+                <a:off x="4099344" y="2531846"/>
+                <a:ext cx="321803" cy="321814"/>
+              </a:xfrm>
+              <a:prstGeom prst="irregularSeal1">
+                <a:avLst/>
+              </a:prstGeom>
+              <a:solidFill>
+                <a:schemeClr val="bg1">
+                  <a:lumMod val="65000"/>
+                </a:schemeClr>
+              </a:solidFill>
+              <a:ln>
+                <a:noFill/>
+              </a:ln>
+              <a:effectLst/>
+            </p:spPr>
+            <p:style>
+              <a:lnRef idx="1">
+                <a:schemeClr val="accent1"/>
+              </a:lnRef>
+              <a:fillRef idx="3">
+                <a:schemeClr val="accent1"/>
+              </a:fillRef>
+              <a:effectRef idx="2">
+                <a:schemeClr val="accent1"/>
+              </a:effectRef>
+              <a:fontRef idx="minor">
+                <a:schemeClr val="lt1"/>
+              </a:fontRef>
+            </p:style>
+            <p:txBody>
+              <a:bodyPr rtlCol="0" anchor="ctr"/>
+              <a:lstStyle/>
+              <a:p>
+                <a:pPr algn="ctr"/>
+                <a:endParaRPr lang="en-GB" sz="2000"/>
+              </a:p>
+            </p:txBody>
+          </p:sp>
+          <p:sp>
+            <p:nvSpPr>
+              <p:cNvPr id="111" name="Explosion 1 110"/>
+              <p:cNvSpPr/>
+              <p:nvPr/>
+            </p:nvSpPr>
+            <p:spPr>
+              <a:xfrm>
+                <a:off x="3400291" y="2152390"/>
+                <a:ext cx="321803" cy="321814"/>
+              </a:xfrm>
+              <a:prstGeom prst="irregularSeal1">
+                <a:avLst/>
+              </a:prstGeom>
+              <a:solidFill>
+                <a:schemeClr val="tx1"/>
+              </a:solidFill>
+              <a:ln>
+                <a:noFill/>
+              </a:ln>
+              <a:effectLst/>
+            </p:spPr>
+            <p:style>
+              <a:lnRef idx="1">
+                <a:schemeClr val="accent1"/>
+              </a:lnRef>
+              <a:fillRef idx="3">
+                <a:schemeClr val="accent1"/>
+              </a:fillRef>
+              <a:effectRef idx="2">
+                <a:schemeClr val="accent1"/>
+              </a:effectRef>
+              <a:fontRef idx="minor">
+                <a:schemeClr val="lt1"/>
+              </a:fontRef>
+            </p:style>
+            <p:txBody>
+              <a:bodyPr rtlCol="0" anchor="ctr"/>
+              <a:lstStyle/>
+              <a:p>
+                <a:pPr algn="ctr"/>
+                <a:endParaRPr lang="en-GB" sz="2000"/>
+              </a:p>
+            </p:txBody>
+          </p:sp>
+        </p:grpSp>
+        <p:sp>
+          <p:nvSpPr>
+            <p:cNvPr id="101" name="Rectangle 100"/>
+            <p:cNvSpPr/>
+            <p:nvPr/>
+          </p:nvSpPr>
+          <p:spPr>
+            <a:xfrm>
+              <a:off x="1162019" y="2068426"/>
+              <a:ext cx="4119541" cy="773193"/>
+            </a:xfrm>
+            <a:prstGeom prst="rect">
+              <a:avLst/>
+            </a:prstGeom>
+            <a:noFill/>
+            <a:ln w="25400">
+              <a:solidFill>
+                <a:schemeClr val="tx1"/>
+              </a:solidFill>
+            </a:ln>
+            <a:effectLst/>
+          </p:spPr>
+          <p:style>
+            <a:lnRef idx="1">
+              <a:schemeClr val="accent1"/>
+            </a:lnRef>
+            <a:fillRef idx="3">
+              <a:schemeClr val="accent1"/>
+            </a:fillRef>
+            <a:effectRef idx="2">
+              <a:schemeClr val="accent1"/>
+            </a:effectRef>
+            <a:fontRef idx="minor">
+              <a:schemeClr val="lt1"/>
+            </a:fontRef>
+          </p:style>
+          <p:txBody>
+            <a:bodyPr rtlCol="0" anchor="ctr"/>
+            <a:lstStyle/>
+            <a:p>
+              <a:pPr algn="ctr"/>
+              <a:endParaRPr lang="en-GB" sz="2000"/>
+            </a:p>
+          </p:txBody>
+        </p:sp>
+        <p:sp>
+          <p:nvSpPr>
+            <p:cNvPr id="102" name="Rectangle 101"/>
+            <p:cNvSpPr/>
+            <p:nvPr/>
+          </p:nvSpPr>
+          <p:spPr>
+            <a:xfrm>
+              <a:off x="1162620" y="2452183"/>
+              <a:ext cx="1365883" cy="388934"/>
+            </a:xfrm>
+            <a:prstGeom prst="rect">
+              <a:avLst/>
+            </a:prstGeom>
+            <a:noFill/>
+            <a:ln w="19050">
+              <a:solidFill>
+                <a:schemeClr val="tx1"/>
+              </a:solidFill>
+            </a:ln>
+            <a:effectLst/>
+          </p:spPr>
+          <p:style>
+            <a:lnRef idx="1">
+              <a:schemeClr val="accent1"/>
+            </a:lnRef>
+            <a:fillRef idx="3">
+              <a:schemeClr val="accent1"/>
+            </a:fillRef>
+            <a:effectRef idx="2">
+              <a:schemeClr val="accent1"/>
+            </a:effectRef>
+            <a:fontRef idx="minor">
+              <a:schemeClr val="lt1"/>
+            </a:fontRef>
+          </p:style>
+          <p:txBody>
+            <a:bodyPr rtlCol="0" anchor="ctr"/>
+            <a:lstStyle/>
+            <a:p>
+              <a:pPr algn="ctr"/>
+              <a:endParaRPr lang="en-GB" sz="2000"/>
+            </a:p>
+          </p:txBody>
+        </p:sp>
+        <p:sp>
+          <p:nvSpPr>
+            <p:cNvPr id="103" name="Rectangle 102"/>
+            <p:cNvSpPr/>
+            <p:nvPr/>
+          </p:nvSpPr>
+          <p:spPr>
+            <a:xfrm>
+              <a:off x="1162620" y="2068426"/>
+              <a:ext cx="1365883" cy="388934"/>
+            </a:xfrm>
+            <a:prstGeom prst="rect">
+              <a:avLst/>
+            </a:prstGeom>
+            <a:noFill/>
+            <a:ln w="19050">
+              <a:solidFill>
+                <a:schemeClr val="tx1"/>
+              </a:solidFill>
+            </a:ln>
+            <a:effectLst/>
+          </p:spPr>
+          <p:style>
+            <a:lnRef idx="1">
+              <a:schemeClr val="accent1"/>
+            </a:lnRef>
+            <a:fillRef idx="3">
+              <a:schemeClr val="accent1"/>
+            </a:fillRef>
+            <a:effectRef idx="2">
+              <a:schemeClr val="accent1"/>
+            </a:effectRef>
+            <a:fontRef idx="minor">
+              <a:schemeClr val="lt1"/>
+            </a:fontRef>
+          </p:style>
+          <p:txBody>
+            <a:bodyPr rtlCol="0" anchor="ctr"/>
+            <a:lstStyle/>
+            <a:p>
+              <a:pPr algn="ctr"/>
+              <a:endParaRPr lang="en-GB" sz="2000"/>
+            </a:p>
+          </p:txBody>
+        </p:sp>
+        <p:sp>
+          <p:nvSpPr>
+            <p:cNvPr id="104" name="TextBox 103"/>
+            <p:cNvSpPr txBox="1"/>
+            <p:nvPr/>
+          </p:nvSpPr>
+          <p:spPr>
+            <a:xfrm>
+              <a:off x="1240323" y="1977954"/>
+              <a:ext cx="1237628" cy="487832"/>
+            </a:xfrm>
+            <a:prstGeom prst="rect">
+              <a:avLst/>
+            </a:prstGeom>
+            <a:noFill/>
+          </p:spPr>
+          <p:txBody>
+            <a:bodyPr wrap="square" rtlCol="0">
+              <a:spAutoFit/>
+            </a:bodyPr>
+            <a:lstStyle/>
+            <a:p>
+              <a:pPr algn="ctr"/>
+              <a:r>
+                <a:rPr lang="en-GB" sz="2000" dirty="0" smtClean="0">
+                  <a:latin typeface="Times New Roman"/>
+                  <a:cs typeface="Times New Roman"/>
+                </a:rPr>
+                <a:t>Exp. 6</a:t>
+              </a:r>
+              <a:endParaRPr lang="en-GB" sz="2000" dirty="0">
+                <a:latin typeface="Times New Roman"/>
+                <a:cs typeface="Times New Roman"/>
+              </a:endParaRPr>
+            </a:p>
+          </p:txBody>
+        </p:sp>
+        <p:sp>
+          <p:nvSpPr>
+            <p:cNvPr id="105" name="TextBox 104"/>
+            <p:cNvSpPr txBox="1"/>
+            <p:nvPr/>
+          </p:nvSpPr>
+          <p:spPr>
+            <a:xfrm>
+              <a:off x="1193860" y="2358766"/>
+              <a:ext cx="1317555" cy="487832"/>
+            </a:xfrm>
+            <a:prstGeom prst="rect">
+              <a:avLst/>
+            </a:prstGeom>
+            <a:noFill/>
+          </p:spPr>
+          <p:txBody>
+            <a:bodyPr wrap="square" rtlCol="0">
+              <a:spAutoFit/>
+            </a:bodyPr>
+            <a:lstStyle/>
+            <a:p>
+              <a:pPr algn="ctr"/>
+              <a:r>
+                <a:rPr lang="en-GB" sz="2000" dirty="0" smtClean="0">
+                  <a:latin typeface="Times New Roman"/>
+                  <a:cs typeface="Times New Roman"/>
+                </a:rPr>
+                <a:t>Exp. 5</a:t>
+              </a:r>
+              <a:endParaRPr lang="en-GB" sz="2000" dirty="0">
+                <a:latin typeface="Times New Roman"/>
+                <a:cs typeface="Times New Roman"/>
+              </a:endParaRPr>
+            </a:p>
+          </p:txBody>
+        </p:sp>
+        <p:sp>
+          <p:nvSpPr>
+            <p:cNvPr id="106" name="Rectangle 105"/>
+            <p:cNvSpPr/>
+            <p:nvPr/>
+          </p:nvSpPr>
+          <p:spPr>
+            <a:xfrm>
+              <a:off x="2528503" y="2456982"/>
+              <a:ext cx="2759019" cy="388934"/>
+            </a:xfrm>
+            <a:prstGeom prst="rect">
+              <a:avLst/>
+            </a:prstGeom>
+            <a:noFill/>
+            <a:ln w="19050">
+              <a:solidFill>
+                <a:schemeClr val="tx1"/>
+              </a:solidFill>
+            </a:ln>
+            <a:effectLst/>
+          </p:spPr>
+          <p:style>
+            <a:lnRef idx="1">
+              <a:schemeClr val="accent1"/>
+            </a:lnRef>
+            <a:fillRef idx="3">
+              <a:schemeClr val="accent1"/>
+            </a:fillRef>
+            <a:effectRef idx="2">
+              <a:schemeClr val="accent1"/>
+            </a:effectRef>
+            <a:fontRef idx="minor">
+              <a:schemeClr val="lt1"/>
+            </a:fontRef>
+          </p:style>
+          <p:txBody>
+            <a:bodyPr rtlCol="0" anchor="ctr"/>
+            <a:lstStyle/>
+            <a:p>
+              <a:pPr algn="ctr"/>
+              <a:endParaRPr lang="en-GB" sz="2000"/>
+            </a:p>
+          </p:txBody>
+        </p:sp>
+        <p:sp>
+          <p:nvSpPr>
+            <p:cNvPr id="107" name="Rectangle 106"/>
+            <p:cNvSpPr/>
+            <p:nvPr/>
+          </p:nvSpPr>
+          <p:spPr>
+            <a:xfrm>
+              <a:off x="2527300" y="2068426"/>
+              <a:ext cx="2759019" cy="388934"/>
+            </a:xfrm>
+            <a:prstGeom prst="rect">
+              <a:avLst/>
+            </a:prstGeom>
+            <a:noFill/>
+            <a:ln w="19050">
+              <a:solidFill>
+                <a:schemeClr val="tx1"/>
+              </a:solidFill>
+            </a:ln>
+            <a:effectLst/>
+          </p:spPr>
+          <p:style>
+            <a:lnRef idx="1">
+              <a:schemeClr val="accent1"/>
+            </a:lnRef>
+            <a:fillRef idx="3">
+              <a:schemeClr val="accent1"/>
+            </a:fillRef>
+            <a:effectRef idx="2">
+              <a:schemeClr val="accent1"/>
+            </a:effectRef>
+            <a:fontRef idx="minor">
+              <a:schemeClr val="lt1"/>
+            </a:fontRef>
+          </p:style>
+          <p:txBody>
+            <a:bodyPr rtlCol="0" anchor="ctr"/>
+            <a:lstStyle/>
+            <a:p>
+              <a:pPr algn="ctr"/>
+              <a:endParaRPr lang="en-GB" sz="2000"/>
+            </a:p>
+          </p:txBody>
+        </p:sp>
+      </p:grpSp>
+      <p:cxnSp>
+        <p:nvCxnSpPr>
+          <p:cNvPr id="135" name="Straight Arrow Connector 134"/>
+          <p:cNvCxnSpPr/>
+          <p:nvPr/>
+        </p:nvCxnSpPr>
+        <p:spPr>
+          <a:xfrm flipV="1">
+            <a:off x="2312144" y="642726"/>
+            <a:ext cx="5517273" cy="2467788"/>
+          </a:xfrm>
+          <a:prstGeom prst="straightConnector1">
+            <a:avLst/>
+          </a:prstGeom>
+          <a:ln>
+            <a:solidFill>
+              <a:schemeClr val="tx1"/>
+            </a:solidFill>
+            <a:tailEnd type="arrow"/>
+          </a:ln>
+          <a:effectLst/>
+        </p:spPr>
+        <p:style>
+          <a:lnRef idx="2">
+            <a:schemeClr val="accent1"/>
+          </a:lnRef>
+          <a:fillRef idx="0">
+            <a:schemeClr val="accent1"/>
+          </a:fillRef>
+          <a:effectRef idx="1">
+            <a:schemeClr val="accent1"/>
+          </a:effectRef>
+          <a:fontRef idx="minor">
+            <a:schemeClr val="tx1"/>
+          </a:fontRef>
+        </p:style>
+      </p:cxnSp>
+      <p:grpSp>
+        <p:nvGrpSpPr>
+          <p:cNvPr id="37" name="Group 36"/>
+          <p:cNvGrpSpPr/>
+          <p:nvPr/>
+        </p:nvGrpSpPr>
+        <p:grpSpPr>
+          <a:xfrm>
+            <a:off x="23234" y="1702695"/>
+            <a:ext cx="719452" cy="719452"/>
+            <a:chOff x="1874554" y="343109"/>
+            <a:chExt cx="719452" cy="719452"/>
+          </a:xfrm>
+        </p:grpSpPr>
+        <p:cxnSp>
+          <p:nvCxnSpPr>
+            <p:cNvPr id="34" name="Straight Arrow Connector 33"/>
+            <p:cNvCxnSpPr/>
+            <p:nvPr/>
+          </p:nvCxnSpPr>
+          <p:spPr>
+            <a:xfrm>
+              <a:off x="1874554" y="860092"/>
+              <a:ext cx="719452" cy="0"/>
+            </a:xfrm>
+            <a:prstGeom prst="straightConnector1">
+              <a:avLst/>
+            </a:prstGeom>
+            <a:ln>
+              <a:solidFill>
+                <a:schemeClr val="tx1"/>
+              </a:solidFill>
+              <a:tailEnd type="arrow"/>
+            </a:ln>
+            <a:effectLst/>
+            <a:scene3d>
+              <a:camera prst="orthographicFront">
+                <a:rot lat="1080000" lon="1560000" rev="0"/>
+              </a:camera>
+              <a:lightRig rig="threePt" dir="t"/>
+            </a:scene3d>
+          </p:spPr>
+          <p:style>
+            <a:lnRef idx="2">
+              <a:schemeClr val="accent1"/>
+            </a:lnRef>
+            <a:fillRef idx="0">
+              <a:schemeClr val="accent1"/>
+            </a:fillRef>
+            <a:effectRef idx="1">
+              <a:schemeClr val="accent1"/>
+            </a:effectRef>
+            <a:fontRef idx="minor">
+              <a:schemeClr val="tx1"/>
+            </a:fontRef>
+          </p:style>
+        </p:cxnSp>
+        <p:cxnSp>
+          <p:nvCxnSpPr>
+            <p:cNvPr id="134" name="Straight Arrow Connector 133"/>
+            <p:cNvCxnSpPr/>
+            <p:nvPr/>
+          </p:nvCxnSpPr>
+          <p:spPr>
+            <a:xfrm rot="16200000">
+              <a:off x="1903836" y="702835"/>
+              <a:ext cx="719452" cy="0"/>
+            </a:xfrm>
+            <a:prstGeom prst="straightConnector1">
+              <a:avLst/>
+            </a:prstGeom>
+            <a:ln>
+              <a:solidFill>
+                <a:schemeClr val="tx1"/>
+              </a:solidFill>
+              <a:tailEnd type="arrow"/>
+            </a:ln>
+            <a:effectLst/>
+            <a:scene3d>
+              <a:camera prst="orthographicFront">
+                <a:rot lat="0" lon="1560000" rev="17640000"/>
+              </a:camera>
+              <a:lightRig rig="threePt" dir="t"/>
+            </a:scene3d>
+          </p:spPr>
+          <p:style>
+            <a:lnRef idx="2">
+              <a:schemeClr val="accent1"/>
+            </a:lnRef>
+            <a:fillRef idx="0">
+              <a:schemeClr val="accent1"/>
+            </a:fillRef>
+            <a:effectRef idx="1">
+              <a:schemeClr val="accent1"/>
+            </a:effectRef>
+            <a:fontRef idx="minor">
+              <a:schemeClr val="tx1"/>
+            </a:fontRef>
+          </p:style>
+        </p:cxnSp>
+      </p:grpSp>
+      <p:sp>
+        <p:nvSpPr>
+          <p:cNvPr id="38" name="TextBox 37"/>
+          <p:cNvSpPr txBox="1"/>
+          <p:nvPr/>
+        </p:nvSpPr>
+        <p:spPr>
+          <a:xfrm>
+            <a:off x="477324" y="2166578"/>
+            <a:ext cx="389138" cy="369332"/>
+          </a:xfrm>
+          <a:prstGeom prst="rect">
+            <a:avLst/>
+          </a:prstGeom>
+          <a:noFill/>
+        </p:spPr>
+        <p:txBody>
+          <a:bodyPr wrap="square" rtlCol="0">
+            <a:spAutoFit/>
+          </a:bodyPr>
+          <a:lstStyle/>
+          <a:p>
+            <a:r>
+              <a:rPr lang="en-GB" dirty="0" smtClean="0">
+                <a:latin typeface="Times New Roman"/>
+                <a:cs typeface="Times New Roman"/>
+              </a:rPr>
+              <a:t>x</a:t>
+            </a:r>
+            <a:endParaRPr lang="en-GB" dirty="0">
+              <a:latin typeface="Times New Roman"/>
+              <a:cs typeface="Times New Roman"/>
+            </a:endParaRPr>
+          </a:p>
+        </p:txBody>
+      </p:sp>
+      <p:sp>
+        <p:nvSpPr>
+          <p:cNvPr id="136" name="TextBox 135"/>
+          <p:cNvSpPr txBox="1"/>
+          <p:nvPr/>
+        </p:nvSpPr>
+        <p:spPr>
+          <a:xfrm>
+            <a:off x="353548" y="1559993"/>
+            <a:ext cx="389138" cy="369332"/>
+          </a:xfrm>
+          <a:prstGeom prst="rect">
+            <a:avLst/>
+          </a:prstGeom>
+          <a:noFill/>
+        </p:spPr>
+        <p:txBody>
+          <a:bodyPr wrap="square" rtlCol="0">
+            <a:spAutoFit/>
+          </a:bodyPr>
+          <a:lstStyle/>
+          <a:p>
+            <a:r>
+              <a:rPr lang="en-GB" dirty="0">
+                <a:latin typeface="Times New Roman"/>
+                <a:cs typeface="Times New Roman"/>
+              </a:rPr>
+              <a:t>y</a:t>
+            </a:r>
+          </a:p>
+        </p:txBody>
+      </p:sp>
+    </p:spTree>
+    <p:extLst>
+      <p:ext uri="{BB962C8B-B14F-4D97-AF65-F5344CB8AC3E}">
+        <p14:creationId xmlns:p14="http://schemas.microsoft.com/office/powerpoint/2010/main" val="2344251850"/>
+      </p:ext>
+    </p:extLst>
+  </p:cSld>
+  <p:clrMapOvr>
+    <a:masterClrMapping/>
+  </p:clrMapOvr>
+  <p:timing>
+    <p:tnLst>
+      <p:par>
+        <p:cTn xmlns:p14="http://schemas.microsoft.com/office/powerpoint/2010/main" id="1" dur="indefinite" restart="never" nodeType="tmRoot"/>
+      </p:par>
+    </p:tnLst>
+  </p:timing>
+</p:sld>
+</file>
+
 <file path=ppt/theme/theme1.xml><?xml version="1.0" encoding="utf-8"?>
 <a:theme xmlns:a="http://schemas.openxmlformats.org/drawingml/2006/main" name="Office Theme">
   <a:themeElements>

</xml_diff>